<commit_message>
adding error to lecture 1 sims
</commit_message>
<xml_diff>
--- a/Lecture1 _v2.pptx
+++ b/Lecture1 _v2.pptx
@@ -5,7 +5,7 @@
     <p:sldMasterId id="2147483648" r:id="rId1"/>
   </p:sldMasterIdLst>
   <p:notesMasterIdLst>
-    <p:notesMasterId r:id="rId21"/>
+    <p:notesMasterId r:id="rId27"/>
   </p:notesMasterIdLst>
   <p:sldIdLst>
     <p:sldId id="256" r:id="rId2"/>
@@ -18,32 +18,38 @@
     <p:sldId id="262" r:id="rId9"/>
     <p:sldId id="263" r:id="rId10"/>
     <p:sldId id="264" r:id="rId11"/>
-    <p:sldId id="265" r:id="rId12"/>
-    <p:sldId id="266" r:id="rId13"/>
-    <p:sldId id="269" r:id="rId14"/>
-    <p:sldId id="270" r:id="rId15"/>
-    <p:sldId id="271" r:id="rId16"/>
-    <p:sldId id="272" r:id="rId17"/>
-    <p:sldId id="273" r:id="rId18"/>
-    <p:sldId id="274" r:id="rId19"/>
-    <p:sldId id="267" r:id="rId20"/>
+    <p:sldId id="275" r:id="rId12"/>
+    <p:sldId id="276" r:id="rId13"/>
+    <p:sldId id="280" r:id="rId14"/>
+    <p:sldId id="282" r:id="rId15"/>
+    <p:sldId id="281" r:id="rId16"/>
+    <p:sldId id="277" r:id="rId17"/>
+    <p:sldId id="278" r:id="rId18"/>
+    <p:sldId id="279" r:id="rId19"/>
+    <p:sldId id="269" r:id="rId20"/>
+    <p:sldId id="270" r:id="rId21"/>
+    <p:sldId id="271" r:id="rId22"/>
+    <p:sldId id="272" r:id="rId23"/>
+    <p:sldId id="273" r:id="rId24"/>
+    <p:sldId id="274" r:id="rId25"/>
+    <p:sldId id="267" r:id="rId26"/>
   </p:sldIdLst>
   <p:sldSz cx="12192000" cy="6858000"/>
   <p:notesSz cx="6858000" cy="9144000"/>
   <p:embeddedFontLst>
     <p:embeddedFont>
       <p:font typeface="Calibri" panose="020F0502020204030204" pitchFamily="34" charset="0"/>
-      <p:regular r:id="rId22"/>
-      <p:bold r:id="rId23"/>
-      <p:italic r:id="rId24"/>
-      <p:boldItalic r:id="rId25"/>
+      <p:regular r:id="rId28"/>
+      <p:bold r:id="rId29"/>
+      <p:italic r:id="rId30"/>
+      <p:boldItalic r:id="rId31"/>
     </p:embeddedFont>
     <p:embeddedFont>
       <p:font typeface="Century Gothic" panose="020B0502020202020204" pitchFamily="34" charset="0"/>
-      <p:regular r:id="rId26"/>
-      <p:bold r:id="rId27"/>
-      <p:italic r:id="rId28"/>
-      <p:boldItalic r:id="rId29"/>
+      <p:regular r:id="rId32"/>
+      <p:bold r:id="rId33"/>
+      <p:italic r:id="rId34"/>
+      <p:boldItalic r:id="rId35"/>
     </p:embeddedFont>
   </p:embeddedFontLst>
   <p:defaultTextStyle>
@@ -276,8 +282,11 @@
     </a:lvl9pPr>
   </p:defaultTextStyle>
   <p:extLst>
+    <p:ext uri="{EFAFB233-063F-42B5-8137-9DF3F51BA10A}">
+      <p15:sldGuideLst xmlns:p15="http://schemas.microsoft.com/office/powerpoint/2012/main"/>
+    </p:ext>
     <p:ext uri="GoogleSlidesCustomDataVersion2">
-      <go:slidesCustomData xmlns:go="http://customooxmlschemas.google.com/" xmlns:ahyp="http://schemas.microsoft.com/office/drawing/2018/hyperlinkcolor" xmlns:p15="http://schemas.microsoft.com/office/powerpoint/2012/main" xmlns:p14="http://schemas.microsoft.com/office/powerpoint/2010/main" xmlns:com="http://schemas.openxmlformats.org/drawingml/2006/compatibility" xmlns:pvml="urn:schemas-microsoft-com:office:powerpoint" xmlns:v="urn:schemas-microsoft-com:vml" xmlns:o="urn:schemas-microsoft-com:office:office" xmlns:dgm="http://schemas.openxmlformats.org/drawingml/2006/diagram" xmlns:c="http://schemas.openxmlformats.org/drawingml/2006/chart" xmlns:mv="urn:schemas-microsoft-com:mac:vml" xmlns:mc="http://schemas.openxmlformats.org/markup-compatibility/2006" xmlns="" r:id="rId30" roundtripDataSignature="AMtx7mhEk3kr15p5MvOwX8Siehu9UxAE2A=="/>
+      <go:slidesCustomData xmlns="" xmlns:mc="http://schemas.openxmlformats.org/markup-compatibility/2006" xmlns:mv="urn:schemas-microsoft-com:mac:vml" xmlns:c="http://schemas.openxmlformats.org/drawingml/2006/chart" xmlns:dgm="http://schemas.openxmlformats.org/drawingml/2006/diagram" xmlns:o="urn:schemas-microsoft-com:office:office" xmlns:v="urn:schemas-microsoft-com:vml" xmlns:pvml="urn:schemas-microsoft-com:office:powerpoint" xmlns:com="http://schemas.openxmlformats.org/drawingml/2006/compatibility" xmlns:p14="http://schemas.microsoft.com/office/powerpoint/2010/main" xmlns:p15="http://schemas.microsoft.com/office/powerpoint/2012/main" xmlns:ahyp="http://schemas.microsoft.com/office/drawing/2018/hyperlinkcolor" xmlns:go="http://customooxmlschemas.google.com/" r:id="rId36" roundtripDataSignature="AMtx7mhEk3kr15p5MvOwX8Siehu9UxAE2A=="/>
     </p:ext>
   </p:extLst>
 </p:presentation>
@@ -1581,11 +1590,11 @@
 </file>
 
 <file path=ppt/notesSlides/notesSlide10.xml><?xml version="1.0" encoding="utf-8"?>
-<p:notes xmlns:a="http://schemas.openxmlformats.org/drawingml/2006/main" xmlns:r="http://schemas.openxmlformats.org/officeDocument/2006/relationships" xmlns:p="http://schemas.openxmlformats.org/presentationml/2006/main" showMasterSp="0" showMasterPhAnim="0">
+<p:notes xmlns:a="http://schemas.openxmlformats.org/drawingml/2006/main" xmlns:r="http://schemas.openxmlformats.org/officeDocument/2006/relationships" xmlns:p="http://schemas.openxmlformats.org/presentationml/2006/main">
   <p:cSld>
     <p:spTree>
       <p:nvGrpSpPr>
-        <p:cNvPr id="1" name="Shape 222"/>
+        <p:cNvPr id="1" name=""/>
         <p:cNvGrpSpPr/>
         <p:nvPr/>
       </p:nvGrpSpPr>
@@ -1599,131 +1608,72 @@
       </p:grpSpPr>
       <p:sp>
         <p:nvSpPr>
-          <p:cNvPr id="223" name="Google Shape;223;g4ca63f0944dc13cd_0:notes"/>
+          <p:cNvPr id="2" name="Slide Image Placeholder 1"/>
           <p:cNvSpPr>
             <a:spLocks noGrp="1" noRot="1" noChangeAspect="1"/>
           </p:cNvSpPr>
           <p:nvPr>
-            <p:ph type="sldImg" idx="2"/>
+            <p:ph type="sldImg"/>
           </p:nvPr>
         </p:nvSpPr>
-        <p:spPr>
-          <a:xfrm>
-            <a:off x="685800" y="1143000"/>
-            <a:ext cx="5486400" cy="3086100"/>
-          </a:xfrm>
-          <a:custGeom>
-            <a:avLst/>
-            <a:gdLst/>
-            <a:ahLst/>
-            <a:cxnLst/>
-            <a:rect l="l" t="t" r="r" b="b"/>
-            <a:pathLst>
-              <a:path w="120000" h="120000" extrusionOk="0">
-                <a:moveTo>
-                  <a:pt x="0" y="0"/>
-                </a:moveTo>
-                <a:lnTo>
-                  <a:pt x="120000" y="0"/>
-                </a:lnTo>
-                <a:lnTo>
-                  <a:pt x="120000" y="120000"/>
-                </a:lnTo>
-                <a:lnTo>
-                  <a:pt x="0" y="120000"/>
-                </a:lnTo>
-                <a:close/>
-              </a:path>
-            </a:pathLst>
-          </a:custGeom>
-          <a:noFill/>
-          <a:ln w="12700" cap="flat" cmpd="sng">
-            <a:solidFill>
-              <a:srgbClr val="000000"/>
-            </a:solidFill>
-            <a:prstDash val="solid"/>
-            <a:round/>
-            <a:headEnd type="none" w="sm" len="sm"/>
-            <a:tailEnd type="none" w="sm" len="sm"/>
-          </a:ln>
-        </p:spPr>
+        <p:spPr/>
       </p:sp>
       <p:sp>
         <p:nvSpPr>
-          <p:cNvPr id="224" name="Google Shape;224;g4ca63f0944dc13cd_0:notes"/>
-          <p:cNvSpPr txBox="1">
+          <p:cNvPr id="3" name="Notes Placeholder 2"/>
+          <p:cNvSpPr>
             <a:spLocks noGrp="1"/>
           </p:cNvSpPr>
           <p:nvPr>
             <p:ph type="body" idx="1"/>
           </p:nvPr>
         </p:nvSpPr>
-        <p:spPr>
-          <a:xfrm>
-            <a:off x="685800" y="4400550"/>
-            <a:ext cx="5486400" cy="3600600"/>
-          </a:xfrm>
-          <a:prstGeom prst="rect">
-            <a:avLst/>
-          </a:prstGeom>
-          <a:noFill/>
-          <a:ln>
-            <a:noFill/>
-          </a:ln>
-        </p:spPr>
+        <p:spPr/>
         <p:txBody>
-          <a:bodyPr spcFirstLastPara="1" wrap="square" lIns="91425" tIns="45700" rIns="91425" bIns="45700" anchor="t" anchorCtr="0">
-            <a:noAutofit/>
-          </a:bodyPr>
+          <a:bodyPr/>
           <a:lstStyle/>
           <a:p>
-            <a:pPr marL="0" lvl="0" indent="0" algn="l" rtl="0">
-              <a:spcBef>
-                <a:spcPts val="0"/>
-              </a:spcBef>
-              <a:spcAft>
-                <a:spcPts val="0"/>
-              </a:spcAft>
-              <a:buNone/>
-            </a:pPr>
             <a:r>
-              <a:rPr lang="en-US"/>
-              <a:t>Density plots, where the red plot is where I’m simulated an effect, and black plot where there’s no effect of x on y. So these are distributions of y</a:t>
+              <a:rPr lang="en-US" dirty="0"/>
+              <a:t>Let’s walk through, line by line, what I’ve done here. </a:t>
             </a:r>
-            <a:endParaRPr/>
+            <a:br>
+              <a:rPr lang="en-US" dirty="0"/>
+            </a:br>
+            <a:br>
+              <a:rPr lang="en-US" dirty="0"/>
+            </a:br>
+            <a:r>
+              <a:rPr lang="en-US" dirty="0"/>
+              <a:t>This is on my </a:t>
+            </a:r>
+            <a:r>
+              <a:rPr lang="en-US" dirty="0" err="1"/>
+              <a:t>github</a:t>
+            </a:r>
+            <a:r>
+              <a:rPr lang="en-US" dirty="0"/>
+              <a:t> too, so you can get the code from there – only go to line 16.</a:t>
+            </a:r>
           </a:p>
         </p:txBody>
       </p:sp>
       <p:sp>
         <p:nvSpPr>
-          <p:cNvPr id="225" name="Google Shape;225;g4ca63f0944dc13cd_0:notes"/>
-          <p:cNvSpPr txBox="1">
+          <p:cNvPr id="4" name="Slide Number Placeholder 3"/>
+          <p:cNvSpPr>
             <a:spLocks noGrp="1"/>
           </p:cNvSpPr>
           <p:nvPr>
             <p:ph type="sldNum" idx="12"/>
           </p:nvPr>
         </p:nvSpPr>
-        <p:spPr>
-          <a:xfrm>
-            <a:off x="3884613" y="8685213"/>
-            <a:ext cx="2971800" cy="458700"/>
-          </a:xfrm>
-          <a:prstGeom prst="rect">
-            <a:avLst/>
-          </a:prstGeom>
-          <a:noFill/>
-          <a:ln>
-            <a:noFill/>
-          </a:ln>
-        </p:spPr>
+        <p:spPr/>
         <p:txBody>
-          <a:bodyPr spcFirstLastPara="1" wrap="square" lIns="91425" tIns="45700" rIns="91425" bIns="45700" anchor="b" anchorCtr="0">
-            <a:noAutofit/>
-          </a:bodyPr>
+          <a:bodyPr/>
           <a:lstStyle/>
           <a:p>
-            <a:pPr marL="0" lvl="0" indent="0" algn="r" rtl="0">
+            <a:pPr marL="0" marR="0" lvl="0" indent="0" algn="r" rtl="0">
               <a:spcBef>
                 <a:spcPts val="0"/>
               </a:spcBef>
@@ -1733,14 +1683,35 @@
               <a:buNone/>
             </a:pPr>
             <a:fld id="{00000000-1234-1234-1234-123412341234}" type="slidenum">
-              <a:rPr lang="en-US"/>
+              <a:rPr lang="en-US" sz="1200" b="0" i="0" u="none" strike="noStrike" cap="none" smtClean="0">
+                <a:solidFill>
+                  <a:schemeClr val="dk1"/>
+                </a:solidFill>
+                <a:latin typeface="Calibri"/>
+                <a:ea typeface="Calibri"/>
+                <a:cs typeface="Calibri"/>
+                <a:sym typeface="Calibri"/>
+              </a:rPr>
               <a:t>11</a:t>
             </a:fld>
-            <a:endParaRPr/>
+            <a:endParaRPr lang="en-US" sz="1200" b="0" i="0" u="none" strike="noStrike" cap="none">
+              <a:solidFill>
+                <a:schemeClr val="dk1"/>
+              </a:solidFill>
+              <a:latin typeface="Calibri"/>
+              <a:ea typeface="Calibri"/>
+              <a:cs typeface="Calibri"/>
+              <a:sym typeface="Calibri"/>
+            </a:endParaRPr>
           </a:p>
         </p:txBody>
       </p:sp>
     </p:spTree>
+    <p:extLst>
+      <p:ext uri="{BB962C8B-B14F-4D97-AF65-F5344CB8AC3E}">
+        <p14:creationId xmlns:p14="http://schemas.microsoft.com/office/powerpoint/2010/main" val="4126988921"/>
+      </p:ext>
+    </p:extLst>
   </p:cSld>
   <p:clrMapOvr>
     <a:masterClrMapping/>
@@ -1749,11 +1720,11 @@
 </file>
 
 <file path=ppt/notesSlides/notesSlide11.xml><?xml version="1.0" encoding="utf-8"?>
-<p:notes xmlns:a="http://schemas.openxmlformats.org/drawingml/2006/main" xmlns:r="http://schemas.openxmlformats.org/officeDocument/2006/relationships" xmlns:p="http://schemas.openxmlformats.org/presentationml/2006/main" showMasterSp="0" showMasterPhAnim="0">
+<p:notes xmlns:a="http://schemas.openxmlformats.org/drawingml/2006/main" xmlns:r="http://schemas.openxmlformats.org/officeDocument/2006/relationships" xmlns:p="http://schemas.openxmlformats.org/presentationml/2006/main">
   <p:cSld>
     <p:spTree>
       <p:nvGrpSpPr>
-        <p:cNvPr id="1" name="Shape 231"/>
+        <p:cNvPr id="1" name=""/>
         <p:cNvGrpSpPr/>
         <p:nvPr/>
       </p:nvGrpSpPr>
@@ -1767,84 +1738,101 @@
       </p:grpSpPr>
       <p:sp>
         <p:nvSpPr>
-          <p:cNvPr id="232" name="Google Shape;232;p11:notes"/>
-          <p:cNvSpPr txBox="1">
+          <p:cNvPr id="2" name="Slide Image Placeholder 1"/>
+          <p:cNvSpPr>
+            <a:spLocks noGrp="1" noRot="1" noChangeAspect="1"/>
+          </p:cNvSpPr>
+          <p:nvPr>
+            <p:ph type="sldImg"/>
+          </p:nvPr>
+        </p:nvSpPr>
+        <p:spPr/>
+      </p:sp>
+      <p:sp>
+        <p:nvSpPr>
+          <p:cNvPr id="3" name="Notes Placeholder 2"/>
+          <p:cNvSpPr>
             <a:spLocks noGrp="1"/>
           </p:cNvSpPr>
           <p:nvPr>
             <p:ph type="body" idx="1"/>
           </p:nvPr>
         </p:nvSpPr>
-        <p:spPr>
-          <a:xfrm>
-            <a:off x="685800" y="4400550"/>
-            <a:ext cx="5486400" cy="3600450"/>
-          </a:xfrm>
-          <a:prstGeom prst="rect">
-            <a:avLst/>
-          </a:prstGeom>
-        </p:spPr>
+        <p:spPr/>
         <p:txBody>
-          <a:bodyPr spcFirstLastPara="1" wrap="square" lIns="91425" tIns="45700" rIns="91425" bIns="45700" anchor="t" anchorCtr="0">
-            <a:noAutofit/>
-          </a:bodyPr>
+          <a:bodyPr/>
           <a:lstStyle/>
           <a:p>
-            <a:pPr marL="0" lvl="0" indent="0" algn="l" rtl="0">
-              <a:spcBef>
-                <a:spcPts val="0"/>
-              </a:spcBef>
-              <a:spcAft>
-                <a:spcPts val="0"/>
-              </a:spcAft>
-              <a:buNone/>
-            </a:pPr>
-            <a:endParaRPr/>
+            <a:r>
+              <a:rPr lang="en-US" dirty="0"/>
+              <a:t>Are these lines all statistically significant? Why or why not?</a:t>
+            </a:r>
+          </a:p>
+          <a:p>
+            <a:endParaRPr lang="en-US" dirty="0"/>
+          </a:p>
+          <a:p>
+            <a:r>
+              <a:rPr lang="en-US" dirty="0"/>
+              <a:t>Actually, they all are! The underlying causal pattern is literally the same. There is an effect of x on y. And there’s a lot of data here! But, it gets harder to see with lots of noise, and it means less biologically with lots of noise. </a:t>
+            </a:r>
           </a:p>
         </p:txBody>
       </p:sp>
       <p:sp>
         <p:nvSpPr>
-          <p:cNvPr id="233" name="Google Shape;233;p11:notes"/>
+          <p:cNvPr id="4" name="Slide Number Placeholder 3"/>
           <p:cNvSpPr>
-            <a:spLocks noGrp="1" noRot="1" noChangeAspect="1"/>
+            <a:spLocks noGrp="1"/>
           </p:cNvSpPr>
           <p:nvPr>
-            <p:ph type="sldImg" idx="2"/>
+            <p:ph type="sldNum" idx="12"/>
           </p:nvPr>
         </p:nvSpPr>
-        <p:spPr>
-          <a:xfrm>
-            <a:off x="685800" y="1143000"/>
-            <a:ext cx="5486400" cy="3086100"/>
-          </a:xfrm>
-          <a:custGeom>
-            <a:avLst/>
-            <a:gdLst/>
-            <a:ahLst/>
-            <a:cxnLst/>
-            <a:rect l="l" t="t" r="r" b="b"/>
-            <a:pathLst>
-              <a:path w="120000" h="120000" extrusionOk="0">
-                <a:moveTo>
-                  <a:pt x="0" y="0"/>
-                </a:moveTo>
-                <a:lnTo>
-                  <a:pt x="120000" y="0"/>
-                </a:lnTo>
-                <a:lnTo>
-                  <a:pt x="120000" y="120000"/>
-                </a:lnTo>
-                <a:lnTo>
-                  <a:pt x="0" y="120000"/>
-                </a:lnTo>
-                <a:close/>
-              </a:path>
-            </a:pathLst>
-          </a:custGeom>
-        </p:spPr>
+        <p:spPr/>
+        <p:txBody>
+          <a:bodyPr/>
+          <a:lstStyle/>
+          <a:p>
+            <a:pPr marL="0" marR="0" lvl="0" indent="0" algn="r" rtl="0">
+              <a:spcBef>
+                <a:spcPts val="0"/>
+              </a:spcBef>
+              <a:spcAft>
+                <a:spcPts val="0"/>
+              </a:spcAft>
+              <a:buNone/>
+            </a:pPr>
+            <a:fld id="{00000000-1234-1234-1234-123412341234}" type="slidenum">
+              <a:rPr lang="en-US" sz="1200" b="0" i="0" u="none" strike="noStrike" cap="none" smtClean="0">
+                <a:solidFill>
+                  <a:schemeClr val="dk1"/>
+                </a:solidFill>
+                <a:latin typeface="Calibri"/>
+                <a:ea typeface="Calibri"/>
+                <a:cs typeface="Calibri"/>
+                <a:sym typeface="Calibri"/>
+              </a:rPr>
+              <a:t>15</a:t>
+            </a:fld>
+            <a:endParaRPr lang="en-US" sz="1200" b="0" i="0" u="none" strike="noStrike" cap="none">
+              <a:solidFill>
+                <a:schemeClr val="dk1"/>
+              </a:solidFill>
+              <a:latin typeface="Calibri"/>
+              <a:ea typeface="Calibri"/>
+              <a:cs typeface="Calibri"/>
+              <a:sym typeface="Calibri"/>
+            </a:endParaRPr>
+          </a:p>
+        </p:txBody>
       </p:sp>
     </p:spTree>
+    <p:extLst>
+      <p:ext uri="{BB962C8B-B14F-4D97-AF65-F5344CB8AC3E}">
+        <p14:creationId xmlns:p14="http://schemas.microsoft.com/office/powerpoint/2010/main" val="579025500"/>
+      </p:ext>
+    </p:extLst>
   </p:cSld>
   <p:clrMapOvr>
     <a:masterClrMapping/>
@@ -2695,7 +2683,11 @@
               </a:spcAft>
               <a:buNone/>
             </a:pPr>
-            <a:endParaRPr/>
+            <a:r>
+              <a:rPr lang="en-US" dirty="0"/>
+              <a:t>What’s the problem here?! Has anyone ever seen a plot like this in their own work?</a:t>
+            </a:r>
+            <a:endParaRPr dirty="0"/>
           </a:p>
         </p:txBody>
       </p:sp>
@@ -20375,6 +20367,36 @@
           </a:p>
         </p:txBody>
       </p:sp>
+      <p:pic>
+        <p:nvPicPr>
+          <p:cNvPr id="3" name="Picture 2">
+            <a:extLst>
+              <a:ext uri="{FF2B5EF4-FFF2-40B4-BE49-F238E27FC236}">
+                <a16:creationId xmlns:a16="http://schemas.microsoft.com/office/drawing/2014/main" id="{6C6CAF55-D50C-0840-A825-A3BC58AF6BCA}"/>
+              </a:ext>
+            </a:extLst>
+          </p:cNvPr>
+          <p:cNvPicPr>
+            <a:picLocks noChangeAspect="1"/>
+          </p:cNvPicPr>
+          <p:nvPr/>
+        </p:nvPicPr>
+        <p:blipFill>
+          <a:blip r:embed="rId3"/>
+          <a:stretch>
+            <a:fillRect/>
+          </a:stretch>
+        </p:blipFill>
+        <p:spPr>
+          <a:xfrm>
+            <a:off x="3125488" y="1160252"/>
+            <a:ext cx="8379124" cy="5586083"/>
+          </a:xfrm>
+          <a:prstGeom prst="rect">
+            <a:avLst/>
+          </a:prstGeom>
+        </p:spPr>
+      </p:pic>
     </p:spTree>
   </p:cSld>
   <p:clrMapOvr>
@@ -20388,7 +20410,66 @@
   <p:cSld>
     <p:spTree>
       <p:nvGrpSpPr>
-        <p:cNvPr id="1" name="Shape 226"/>
+        <p:cNvPr id="1" name=""/>
+        <p:cNvGrpSpPr/>
+        <p:nvPr/>
+      </p:nvGrpSpPr>
+      <p:grpSpPr>
+        <a:xfrm>
+          <a:off x="0" y="0"/>
+          <a:ext cx="0" cy="0"/>
+          <a:chOff x="0" y="0"/>
+          <a:chExt cx="0" cy="0"/>
+        </a:xfrm>
+      </p:grpSpPr>
+      <p:pic>
+        <p:nvPicPr>
+          <p:cNvPr id="9" name="Picture 8" descr="A screenshot of a computer&#10;&#10;Description automatically generated">
+            <a:extLst>
+              <a:ext uri="{FF2B5EF4-FFF2-40B4-BE49-F238E27FC236}">
+                <a16:creationId xmlns:a16="http://schemas.microsoft.com/office/drawing/2014/main" id="{A2D97ABE-A8AA-554F-96A1-CECEDDF26718}"/>
+              </a:ext>
+            </a:extLst>
+          </p:cNvPr>
+          <p:cNvPicPr>
+            <a:picLocks noChangeAspect="1"/>
+          </p:cNvPicPr>
+          <p:nvPr/>
+        </p:nvPicPr>
+        <p:blipFill rotWithShape="1">
+          <a:blip r:embed="rId3"/>
+          <a:srcRect t="10943" r="48342" b="37107"/>
+          <a:stretch/>
+        </p:blipFill>
+        <p:spPr>
+          <a:xfrm>
+            <a:off x="2490967" y="1043794"/>
+            <a:ext cx="8065891" cy="4580627"/>
+          </a:xfrm>
+          <a:prstGeom prst="rect">
+            <a:avLst/>
+          </a:prstGeom>
+        </p:spPr>
+      </p:pic>
+    </p:spTree>
+    <p:extLst>
+      <p:ext uri="{BB962C8B-B14F-4D97-AF65-F5344CB8AC3E}">
+        <p14:creationId xmlns:p14="http://schemas.microsoft.com/office/powerpoint/2010/main" val="1217334939"/>
+      </p:ext>
+    </p:extLst>
+  </p:cSld>
+  <p:clrMapOvr>
+    <a:masterClrMapping/>
+  </p:clrMapOvr>
+</p:sld>
+</file>
+
+<file path=ppt/slides/slide12.xml><?xml version="1.0" encoding="utf-8"?>
+<p:sld xmlns:a="http://schemas.openxmlformats.org/drawingml/2006/main" xmlns:r="http://schemas.openxmlformats.org/officeDocument/2006/relationships" xmlns:p="http://schemas.openxmlformats.org/presentationml/2006/main">
+  <p:cSld>
+    <p:spTree>
+      <p:nvGrpSpPr>
+        <p:cNvPr id="1" name=""/>
         <p:cNvGrpSpPr/>
         <p:nvPr/>
       </p:nvGrpSpPr>
@@ -20402,178 +20483,63 @@
       </p:grpSpPr>
       <p:sp>
         <p:nvSpPr>
-          <p:cNvPr id="227" name="Google Shape;227;g4ca63f0944dc13cd_0"/>
-          <p:cNvSpPr txBox="1">
+          <p:cNvPr id="2" name="Title 1">
+            <a:extLst>
+              <a:ext uri="{FF2B5EF4-FFF2-40B4-BE49-F238E27FC236}">
+                <a16:creationId xmlns:a16="http://schemas.microsoft.com/office/drawing/2014/main" id="{8468ED83-B881-C349-AEEA-4DF3348F9B7A}"/>
+              </a:ext>
+            </a:extLst>
+          </p:cNvPr>
+          <p:cNvSpPr>
             <a:spLocks noGrp="1"/>
           </p:cNvSpPr>
           <p:nvPr>
             <p:ph type="title"/>
           </p:nvPr>
         </p:nvSpPr>
-        <p:spPr>
-          <a:xfrm>
-            <a:off x="2592925" y="624110"/>
-            <a:ext cx="8911800" cy="1281000"/>
-          </a:xfrm>
-          <a:prstGeom prst="rect">
-            <a:avLst/>
-          </a:prstGeom>
-          <a:noFill/>
-          <a:ln>
-            <a:noFill/>
-          </a:ln>
-        </p:spPr>
+        <p:spPr/>
         <p:txBody>
-          <a:bodyPr spcFirstLastPara="1" wrap="square" lIns="91425" tIns="45700" rIns="91425" bIns="45700" anchor="t" anchorCtr="0">
-            <a:normAutofit/>
-          </a:bodyPr>
+          <a:bodyPr/>
           <a:lstStyle/>
           <a:p>
-            <a:pPr marL="0" lvl="0" indent="0" algn="l" rtl="0">
-              <a:spcBef>
-                <a:spcPts val="0"/>
-              </a:spcBef>
-              <a:spcAft>
-                <a:spcPts val="0"/>
-              </a:spcAft>
-              <a:buClr>
-                <a:srgbClr val="262626"/>
-              </a:buClr>
-              <a:buSzPts val="3600"/>
-              <a:buFont typeface="Century Gothic"/>
-              <a:buNone/>
-            </a:pPr>
             <a:r>
-              <a:rPr lang="en-US"/>
-              <a:t>Linear models</a:t>
+              <a:rPr lang="en-US" dirty="0"/>
+              <a:t>What’s missing in the data?!</a:t>
             </a:r>
-            <a:endParaRPr/>
           </a:p>
         </p:txBody>
       </p:sp>
       <p:sp>
         <p:nvSpPr>
-          <p:cNvPr id="228" name="Google Shape;228;g4ca63f0944dc13cd_0"/>
-          <p:cNvSpPr txBox="1">
+          <p:cNvPr id="3" name="Text Placeholder 2">
+            <a:extLst>
+              <a:ext uri="{FF2B5EF4-FFF2-40B4-BE49-F238E27FC236}">
+                <a16:creationId xmlns:a16="http://schemas.microsoft.com/office/drawing/2014/main" id="{553644EF-7D95-3247-896E-C3270A7A6247}"/>
+              </a:ext>
+            </a:extLst>
+          </p:cNvPr>
+          <p:cNvSpPr>
             <a:spLocks noGrp="1"/>
           </p:cNvSpPr>
           <p:nvPr>
             <p:ph type="body" idx="1"/>
           </p:nvPr>
         </p:nvSpPr>
-        <p:spPr>
-          <a:xfrm>
-            <a:off x="2589212" y="2133600"/>
-            <a:ext cx="8915400" cy="3777600"/>
-          </a:xfrm>
-          <a:prstGeom prst="rect">
-            <a:avLst/>
-          </a:prstGeom>
-          <a:noFill/>
-          <a:ln>
-            <a:noFill/>
-          </a:ln>
-        </p:spPr>
+        <p:spPr/>
         <p:txBody>
-          <a:bodyPr spcFirstLastPara="1" wrap="square" lIns="91425" tIns="45700" rIns="91425" bIns="45700" anchor="t" anchorCtr="0">
-            <a:normAutofit/>
-          </a:bodyPr>
+          <a:bodyPr/>
           <a:lstStyle/>
           <a:p>
-            <a:pPr marL="342900" lvl="0" indent="-342900" algn="l" rtl="0">
-              <a:spcBef>
-                <a:spcPts val="0"/>
-              </a:spcBef>
-              <a:spcAft>
-                <a:spcPts val="0"/>
-              </a:spcAft>
-              <a:buSzPts val="1800"/>
-              <a:buChar char="🠶"/>
-            </a:pPr>
-            <a:r>
-              <a:rPr lang="en-US"/>
-              <a:t>Another way to think about this is, what do I think the underlying distributions of each data set is here?</a:t>
-            </a:r>
-            <a:endParaRPr/>
+            <a:endParaRPr lang="en-US"/>
           </a:p>
         </p:txBody>
       </p:sp>
-      <p:sp>
-        <p:nvSpPr>
-          <p:cNvPr id="229" name="Google Shape;229;g4ca63f0944dc13cd_0"/>
-          <p:cNvSpPr/>
-          <p:nvPr/>
-        </p:nvSpPr>
-        <p:spPr>
-          <a:xfrm>
-            <a:off x="7463481" y="4547286"/>
-            <a:ext cx="766200" cy="259500"/>
-          </a:xfrm>
-          <a:prstGeom prst="rect">
-            <a:avLst/>
-          </a:prstGeom>
-          <a:solidFill>
-            <a:schemeClr val="lt1"/>
-          </a:solidFill>
-          <a:ln>
-            <a:noFill/>
-          </a:ln>
-        </p:spPr>
-        <p:txBody>
-          <a:bodyPr spcFirstLastPara="1" wrap="square" lIns="91425" tIns="45700" rIns="91425" bIns="45700" anchor="ctr" anchorCtr="0">
-            <a:noAutofit/>
-          </a:bodyPr>
-          <a:lstStyle/>
-          <a:p>
-            <a:pPr marL="0" marR="0" lvl="0" indent="0" algn="ctr" rtl="0">
-              <a:spcBef>
-                <a:spcPts val="0"/>
-              </a:spcBef>
-              <a:spcAft>
-                <a:spcPts val="0"/>
-              </a:spcAft>
-              <a:buNone/>
-            </a:pPr>
-            <a:endParaRPr sz="1800" b="0" i="0" u="none" strike="noStrike" cap="none">
-              <a:solidFill>
-                <a:schemeClr val="lt1"/>
-              </a:solidFill>
-              <a:latin typeface="Century Gothic"/>
-              <a:ea typeface="Century Gothic"/>
-              <a:cs typeface="Century Gothic"/>
-              <a:sym typeface="Century Gothic"/>
-            </a:endParaRPr>
-          </a:p>
-        </p:txBody>
-      </p:sp>
-      <p:pic>
-        <p:nvPicPr>
-          <p:cNvPr id="230" name="Google Shape;230;g4ca63f0944dc13cd_0"/>
-          <p:cNvPicPr preferRelativeResize="0"/>
-          <p:nvPr/>
-        </p:nvPicPr>
-        <p:blipFill rotWithShape="1">
-          <a:blip r:embed="rId3">
-            <a:alphaModFix/>
-          </a:blip>
-          <a:srcRect t="15493" r="3390" b="12708"/>
-          <a:stretch/>
-        </p:blipFill>
-        <p:spPr>
-          <a:xfrm>
-            <a:off x="2997200" y="2878666"/>
-            <a:ext cx="7078132" cy="3507134"/>
-          </a:xfrm>
-          <a:prstGeom prst="rect">
-            <a:avLst/>
-          </a:prstGeom>
-          <a:noFill/>
-          <a:ln>
-            <a:noFill/>
-          </a:ln>
-        </p:spPr>
-      </p:pic>
     </p:spTree>
+    <p:extLst>
+      <p:ext uri="{BB962C8B-B14F-4D97-AF65-F5344CB8AC3E}">
+        <p14:creationId xmlns:p14="http://schemas.microsoft.com/office/powerpoint/2010/main" val="3140168163"/>
+      </p:ext>
+    </p:extLst>
   </p:cSld>
   <p:clrMapOvr>
     <a:masterClrMapping/>
@@ -20581,12 +20547,12 @@
 </p:sld>
 </file>
 
-<file path=ppt/slides/slide12.xml><?xml version="1.0" encoding="utf-8"?>
+<file path=ppt/slides/slide13.xml><?xml version="1.0" encoding="utf-8"?>
 <p:sld xmlns:a="http://schemas.openxmlformats.org/drawingml/2006/main" xmlns:r="http://schemas.openxmlformats.org/officeDocument/2006/relationships" xmlns:p="http://schemas.openxmlformats.org/presentationml/2006/main">
   <p:cSld>
     <p:spTree>
       <p:nvGrpSpPr>
-        <p:cNvPr id="1" name="Shape 234"/>
+        <p:cNvPr id="1" name=""/>
         <p:cNvGrpSpPr/>
         <p:nvPr/>
       </p:nvGrpSpPr>
@@ -20600,147 +20566,67 @@
       </p:grpSpPr>
       <p:sp>
         <p:nvSpPr>
-          <p:cNvPr id="235" name="Google Shape;235;p11"/>
-          <p:cNvSpPr txBox="1">
+          <p:cNvPr id="2" name="Title 1">
+            <a:extLst>
+              <a:ext uri="{FF2B5EF4-FFF2-40B4-BE49-F238E27FC236}">
+                <a16:creationId xmlns:a16="http://schemas.microsoft.com/office/drawing/2014/main" id="{3CFF973B-FF21-8440-B286-AB245F9DF6E5}"/>
+              </a:ext>
+            </a:extLst>
+          </p:cNvPr>
+          <p:cNvSpPr>
             <a:spLocks noGrp="1"/>
           </p:cNvSpPr>
           <p:nvPr>
             <p:ph type="title"/>
           </p:nvPr>
         </p:nvSpPr>
-        <p:spPr>
-          <a:xfrm>
-            <a:off x="2592925" y="624110"/>
-            <a:ext cx="8911687" cy="1280890"/>
-          </a:xfrm>
-          <a:prstGeom prst="rect">
-            <a:avLst/>
-          </a:prstGeom>
-          <a:noFill/>
-          <a:ln>
-            <a:noFill/>
-          </a:ln>
-        </p:spPr>
+        <p:spPr/>
         <p:txBody>
-          <a:bodyPr spcFirstLastPara="1" wrap="square" lIns="91425" tIns="45700" rIns="91425" bIns="45700" anchor="t" anchorCtr="0">
-            <a:normAutofit/>
-          </a:bodyPr>
+          <a:bodyPr/>
           <a:lstStyle/>
           <a:p>
-            <a:pPr marL="0" lvl="0" indent="0" algn="l" rtl="0">
-              <a:spcBef>
-                <a:spcPts val="0"/>
-              </a:spcBef>
-              <a:spcAft>
-                <a:spcPts val="0"/>
-              </a:spcAft>
-              <a:buClr>
-                <a:srgbClr val="262626"/>
-              </a:buClr>
-              <a:buSzPts val="3600"/>
-              <a:buFont typeface="Century Gothic"/>
-              <a:buNone/>
-            </a:pPr>
             <a:r>
-              <a:rPr lang="en-US"/>
-              <a:t>Linear models</a:t>
+              <a:rPr lang="en-US" dirty="0"/>
+              <a:t>Error</a:t>
             </a:r>
-            <a:endParaRPr/>
-          </a:p>
-        </p:txBody>
-      </p:sp>
-      <p:sp>
-        <p:nvSpPr>
-          <p:cNvPr id="236" name="Google Shape;236;p11"/>
-          <p:cNvSpPr txBox="1">
-            <a:spLocks noGrp="1"/>
-          </p:cNvSpPr>
-          <p:nvPr>
-            <p:ph type="body" idx="1"/>
-          </p:nvPr>
-        </p:nvSpPr>
-        <p:spPr>
-          <a:xfrm>
-            <a:off x="2589212" y="2133600"/>
-            <a:ext cx="8915400" cy="3777622"/>
-          </a:xfrm>
-          <a:prstGeom prst="rect">
-            <a:avLst/>
-          </a:prstGeom>
-          <a:noFill/>
-          <a:ln>
-            <a:noFill/>
-          </a:ln>
-        </p:spPr>
-        <p:txBody>
-          <a:bodyPr spcFirstLastPara="1" wrap="square" lIns="91425" tIns="45700" rIns="91425" bIns="45700" anchor="t" anchorCtr="0">
-            <a:normAutofit/>
-          </a:bodyPr>
-          <a:lstStyle/>
-          <a:p>
-            <a:pPr marL="342900" lvl="0" indent="-342900" algn="l" rtl="0">
-              <a:spcBef>
-                <a:spcPts val="0"/>
-              </a:spcBef>
-              <a:spcAft>
-                <a:spcPts val="0"/>
-              </a:spcAft>
-              <a:buSzPts val="1800"/>
-              <a:buChar char="🠶"/>
-            </a:pPr>
-            <a:r>
-              <a:rPr lang="en-US"/>
-              <a:t>Most statistical tests are special cases of a linear model</a:t>
-            </a:r>
-            <a:endParaRPr/>
-          </a:p>
-          <a:p>
-            <a:pPr marL="342900" lvl="0" indent="-342900" algn="l" rtl="0">
-              <a:spcBef>
-                <a:spcPts val="1000"/>
-              </a:spcBef>
-              <a:spcAft>
-                <a:spcPts val="0"/>
-              </a:spcAft>
-              <a:buSzPts val="1800"/>
-              <a:buChar char="🠶"/>
-            </a:pPr>
-            <a:r>
-              <a:rPr lang="en-US"/>
-              <a:t>Once you understand a linear model, you can work out the appropriate test</a:t>
-            </a:r>
-            <a:endParaRPr/>
           </a:p>
         </p:txBody>
       </p:sp>
       <p:pic>
         <p:nvPicPr>
-          <p:cNvPr id="237" name="Google Shape;237;p11" descr="A black background with a black square&#10;&#10;Description automatically generated with medium confidence"/>
-          <p:cNvPicPr preferRelativeResize="0"/>
+          <p:cNvPr id="7" name="Picture 6" descr="A screenshot of a computer&#10;&#10;Description automatically generated">
+            <a:extLst>
+              <a:ext uri="{FF2B5EF4-FFF2-40B4-BE49-F238E27FC236}">
+                <a16:creationId xmlns:a16="http://schemas.microsoft.com/office/drawing/2014/main" id="{923238A3-1CD0-1943-B751-C48AD4AEB621}"/>
+              </a:ext>
+            </a:extLst>
+          </p:cNvPr>
+          <p:cNvPicPr>
+            <a:picLocks noChangeAspect="1"/>
+          </p:cNvPicPr>
           <p:nvPr/>
         </p:nvPicPr>
         <p:blipFill rotWithShape="1">
-          <a:blip r:embed="rId3">
-            <a:alphaModFix/>
-          </a:blip>
-          <a:srcRect/>
+          <a:blip r:embed="rId2"/>
+          <a:srcRect l="-196" t="28680" r="74681" b="43019"/>
           <a:stretch/>
         </p:blipFill>
         <p:spPr>
           <a:xfrm>
-            <a:off x="3394200" y="2805300"/>
-            <a:ext cx="5403600" cy="4052700"/>
+            <a:off x="943502" y="1444926"/>
+            <a:ext cx="4565183" cy="2859656"/>
           </a:xfrm>
           <a:prstGeom prst="rect">
             <a:avLst/>
           </a:prstGeom>
-          <a:noFill/>
-          <a:ln>
-            <a:noFill/>
-          </a:ln>
         </p:spPr>
       </p:pic>
     </p:spTree>
+    <p:extLst>
+      <p:ext uri="{BB962C8B-B14F-4D97-AF65-F5344CB8AC3E}">
+        <p14:creationId xmlns:p14="http://schemas.microsoft.com/office/powerpoint/2010/main" val="2404905931"/>
+      </p:ext>
+    </p:extLst>
   </p:cSld>
   <p:clrMapOvr>
     <a:masterClrMapping/>
@@ -20748,7 +20634,526 @@
 </p:sld>
 </file>
 
-<file path=ppt/slides/slide13.xml><?xml version="1.0" encoding="utf-8"?>
+<file path=ppt/slides/slide14.xml><?xml version="1.0" encoding="utf-8"?>
+<p:sld xmlns:a="http://schemas.openxmlformats.org/drawingml/2006/main" xmlns:r="http://schemas.openxmlformats.org/officeDocument/2006/relationships" xmlns:p="http://schemas.openxmlformats.org/presentationml/2006/main">
+  <p:cSld>
+    <p:spTree>
+      <p:nvGrpSpPr>
+        <p:cNvPr id="1" name=""/>
+        <p:cNvGrpSpPr/>
+        <p:nvPr/>
+      </p:nvGrpSpPr>
+      <p:grpSpPr>
+        <a:xfrm>
+          <a:off x="0" y="0"/>
+          <a:ext cx="0" cy="0"/>
+          <a:chOff x="0" y="0"/>
+          <a:chExt cx="0" cy="0"/>
+        </a:xfrm>
+      </p:grpSpPr>
+      <p:sp>
+        <p:nvSpPr>
+          <p:cNvPr id="2" name="Title 1">
+            <a:extLst>
+              <a:ext uri="{FF2B5EF4-FFF2-40B4-BE49-F238E27FC236}">
+                <a16:creationId xmlns:a16="http://schemas.microsoft.com/office/drawing/2014/main" id="{3CFF973B-FF21-8440-B286-AB245F9DF6E5}"/>
+              </a:ext>
+            </a:extLst>
+          </p:cNvPr>
+          <p:cNvSpPr>
+            <a:spLocks noGrp="1"/>
+          </p:cNvSpPr>
+          <p:nvPr>
+            <p:ph type="title"/>
+          </p:nvPr>
+        </p:nvSpPr>
+        <p:spPr/>
+        <p:txBody>
+          <a:bodyPr/>
+          <a:lstStyle/>
+          <a:p>
+            <a:r>
+              <a:rPr lang="en-US" dirty="0"/>
+              <a:t>Error</a:t>
+            </a:r>
+          </a:p>
+        </p:txBody>
+      </p:sp>
+      <p:pic>
+        <p:nvPicPr>
+          <p:cNvPr id="7" name="Picture 6" descr="A screenshot of a computer&#10;&#10;Description automatically generated">
+            <a:extLst>
+              <a:ext uri="{FF2B5EF4-FFF2-40B4-BE49-F238E27FC236}">
+                <a16:creationId xmlns:a16="http://schemas.microsoft.com/office/drawing/2014/main" id="{923238A3-1CD0-1943-B751-C48AD4AEB621}"/>
+              </a:ext>
+            </a:extLst>
+          </p:cNvPr>
+          <p:cNvPicPr>
+            <a:picLocks noChangeAspect="1"/>
+          </p:cNvPicPr>
+          <p:nvPr/>
+        </p:nvPicPr>
+        <p:blipFill rotWithShape="1">
+          <a:blip r:embed="rId2"/>
+          <a:srcRect l="-196" t="28680" r="74681" b="43019"/>
+          <a:stretch/>
+        </p:blipFill>
+        <p:spPr>
+          <a:xfrm>
+            <a:off x="943502" y="1444926"/>
+            <a:ext cx="4565183" cy="2859656"/>
+          </a:xfrm>
+          <a:prstGeom prst="rect">
+            <a:avLst/>
+          </a:prstGeom>
+        </p:spPr>
+      </p:pic>
+      <p:pic>
+        <p:nvPicPr>
+          <p:cNvPr id="9" name="Picture 8">
+            <a:extLst>
+              <a:ext uri="{FF2B5EF4-FFF2-40B4-BE49-F238E27FC236}">
+                <a16:creationId xmlns:a16="http://schemas.microsoft.com/office/drawing/2014/main" id="{817D645D-D1DA-5149-B304-B63AE0D47A8F}"/>
+              </a:ext>
+            </a:extLst>
+          </p:cNvPr>
+          <p:cNvPicPr>
+            <a:picLocks noChangeAspect="1"/>
+          </p:cNvPicPr>
+          <p:nvPr/>
+        </p:nvPicPr>
+        <p:blipFill>
+          <a:blip r:embed="rId3"/>
+          <a:stretch>
+            <a:fillRect/>
+          </a:stretch>
+        </p:blipFill>
+        <p:spPr>
+          <a:xfrm>
+            <a:off x="1056909" y="3764341"/>
+            <a:ext cx="4338367" cy="2892244"/>
+          </a:xfrm>
+          <a:prstGeom prst="rect">
+            <a:avLst/>
+          </a:prstGeom>
+        </p:spPr>
+      </p:pic>
+    </p:spTree>
+    <p:extLst>
+      <p:ext uri="{BB962C8B-B14F-4D97-AF65-F5344CB8AC3E}">
+        <p14:creationId xmlns:p14="http://schemas.microsoft.com/office/powerpoint/2010/main" val="2484197623"/>
+      </p:ext>
+    </p:extLst>
+  </p:cSld>
+  <p:clrMapOvr>
+    <a:masterClrMapping/>
+  </p:clrMapOvr>
+</p:sld>
+</file>
+
+<file path=ppt/slides/slide15.xml><?xml version="1.0" encoding="utf-8"?>
+<p:sld xmlns:a="http://schemas.openxmlformats.org/drawingml/2006/main" xmlns:r="http://schemas.openxmlformats.org/officeDocument/2006/relationships" xmlns:p="http://schemas.openxmlformats.org/presentationml/2006/main">
+  <p:cSld>
+    <p:spTree>
+      <p:nvGrpSpPr>
+        <p:cNvPr id="1" name=""/>
+        <p:cNvGrpSpPr/>
+        <p:nvPr/>
+      </p:nvGrpSpPr>
+      <p:grpSpPr>
+        <a:xfrm>
+          <a:off x="0" y="0"/>
+          <a:ext cx="0" cy="0"/>
+          <a:chOff x="0" y="0"/>
+          <a:chExt cx="0" cy="0"/>
+        </a:xfrm>
+      </p:grpSpPr>
+      <p:sp>
+        <p:nvSpPr>
+          <p:cNvPr id="2" name="Title 1">
+            <a:extLst>
+              <a:ext uri="{FF2B5EF4-FFF2-40B4-BE49-F238E27FC236}">
+                <a16:creationId xmlns:a16="http://schemas.microsoft.com/office/drawing/2014/main" id="{3CFF973B-FF21-8440-B286-AB245F9DF6E5}"/>
+              </a:ext>
+            </a:extLst>
+          </p:cNvPr>
+          <p:cNvSpPr>
+            <a:spLocks noGrp="1"/>
+          </p:cNvSpPr>
+          <p:nvPr>
+            <p:ph type="title"/>
+          </p:nvPr>
+        </p:nvSpPr>
+        <p:spPr/>
+        <p:txBody>
+          <a:bodyPr/>
+          <a:lstStyle/>
+          <a:p>
+            <a:r>
+              <a:rPr lang="en-US" dirty="0"/>
+              <a:t>Error</a:t>
+            </a:r>
+          </a:p>
+        </p:txBody>
+      </p:sp>
+      <p:pic>
+        <p:nvPicPr>
+          <p:cNvPr id="5" name="Picture 4">
+            <a:extLst>
+              <a:ext uri="{FF2B5EF4-FFF2-40B4-BE49-F238E27FC236}">
+                <a16:creationId xmlns:a16="http://schemas.microsoft.com/office/drawing/2014/main" id="{41EED1B3-5026-B946-9EB2-63EFE1141F08}"/>
+              </a:ext>
+            </a:extLst>
+          </p:cNvPr>
+          <p:cNvPicPr>
+            <a:picLocks noChangeAspect="1"/>
+          </p:cNvPicPr>
+          <p:nvPr/>
+        </p:nvPicPr>
+        <p:blipFill>
+          <a:blip r:embed="rId3"/>
+          <a:stretch>
+            <a:fillRect/>
+          </a:stretch>
+        </p:blipFill>
+        <p:spPr>
+          <a:xfrm>
+            <a:off x="5663961" y="1444926"/>
+            <a:ext cx="6528039" cy="4352026"/>
+          </a:xfrm>
+          <a:prstGeom prst="rect">
+            <a:avLst/>
+          </a:prstGeom>
+        </p:spPr>
+      </p:pic>
+      <p:pic>
+        <p:nvPicPr>
+          <p:cNvPr id="7" name="Picture 6" descr="A screenshot of a computer&#10;&#10;Description automatically generated">
+            <a:extLst>
+              <a:ext uri="{FF2B5EF4-FFF2-40B4-BE49-F238E27FC236}">
+                <a16:creationId xmlns:a16="http://schemas.microsoft.com/office/drawing/2014/main" id="{923238A3-1CD0-1943-B751-C48AD4AEB621}"/>
+              </a:ext>
+            </a:extLst>
+          </p:cNvPr>
+          <p:cNvPicPr>
+            <a:picLocks noChangeAspect="1"/>
+          </p:cNvPicPr>
+          <p:nvPr/>
+        </p:nvPicPr>
+        <p:blipFill rotWithShape="1">
+          <a:blip r:embed="rId4"/>
+          <a:srcRect l="-196" t="28680" r="74681" b="43019"/>
+          <a:stretch/>
+        </p:blipFill>
+        <p:spPr>
+          <a:xfrm>
+            <a:off x="943502" y="1444926"/>
+            <a:ext cx="4565183" cy="2859656"/>
+          </a:xfrm>
+          <a:prstGeom prst="rect">
+            <a:avLst/>
+          </a:prstGeom>
+        </p:spPr>
+      </p:pic>
+      <p:pic>
+        <p:nvPicPr>
+          <p:cNvPr id="9" name="Picture 8">
+            <a:extLst>
+              <a:ext uri="{FF2B5EF4-FFF2-40B4-BE49-F238E27FC236}">
+                <a16:creationId xmlns:a16="http://schemas.microsoft.com/office/drawing/2014/main" id="{817D645D-D1DA-5149-B304-B63AE0D47A8F}"/>
+              </a:ext>
+            </a:extLst>
+          </p:cNvPr>
+          <p:cNvPicPr>
+            <a:picLocks noChangeAspect="1"/>
+          </p:cNvPicPr>
+          <p:nvPr/>
+        </p:nvPicPr>
+        <p:blipFill>
+          <a:blip r:embed="rId5"/>
+          <a:stretch>
+            <a:fillRect/>
+          </a:stretch>
+        </p:blipFill>
+        <p:spPr>
+          <a:xfrm>
+            <a:off x="1056909" y="3764341"/>
+            <a:ext cx="4338367" cy="2892244"/>
+          </a:xfrm>
+          <a:prstGeom prst="rect">
+            <a:avLst/>
+          </a:prstGeom>
+        </p:spPr>
+      </p:pic>
+    </p:spTree>
+    <p:extLst>
+      <p:ext uri="{BB962C8B-B14F-4D97-AF65-F5344CB8AC3E}">
+        <p14:creationId xmlns:p14="http://schemas.microsoft.com/office/powerpoint/2010/main" val="633241985"/>
+      </p:ext>
+    </p:extLst>
+  </p:cSld>
+  <p:clrMapOvr>
+    <a:masterClrMapping/>
+  </p:clrMapOvr>
+</p:sld>
+</file>
+
+<file path=ppt/slides/slide16.xml><?xml version="1.0" encoding="utf-8"?>
+<p:sld xmlns:a="http://schemas.openxmlformats.org/drawingml/2006/main" xmlns:r="http://schemas.openxmlformats.org/officeDocument/2006/relationships" xmlns:p="http://schemas.openxmlformats.org/presentationml/2006/main">
+  <p:cSld>
+    <p:spTree>
+      <p:nvGrpSpPr>
+        <p:cNvPr id="1" name=""/>
+        <p:cNvGrpSpPr/>
+        <p:nvPr/>
+      </p:nvGrpSpPr>
+      <p:grpSpPr>
+        <a:xfrm>
+          <a:off x="0" y="0"/>
+          <a:ext cx="0" cy="0"/>
+          <a:chOff x="0" y="0"/>
+          <a:chExt cx="0" cy="0"/>
+        </a:xfrm>
+      </p:grpSpPr>
+      <p:sp>
+        <p:nvSpPr>
+          <p:cNvPr id="2" name="Title 1">
+            <a:extLst>
+              <a:ext uri="{FF2B5EF4-FFF2-40B4-BE49-F238E27FC236}">
+                <a16:creationId xmlns:a16="http://schemas.microsoft.com/office/drawing/2014/main" id="{CF8BA83D-3BBB-F049-B4F4-07DD203E5560}"/>
+              </a:ext>
+            </a:extLst>
+          </p:cNvPr>
+          <p:cNvSpPr>
+            <a:spLocks noGrp="1"/>
+          </p:cNvSpPr>
+          <p:nvPr>
+            <p:ph type="title"/>
+          </p:nvPr>
+        </p:nvSpPr>
+        <p:spPr/>
+        <p:txBody>
+          <a:bodyPr/>
+          <a:lstStyle/>
+          <a:p>
+            <a:r>
+              <a:rPr lang="en-US" dirty="0"/>
+              <a:t>Reducible error vs. Irreducible error</a:t>
+            </a:r>
+          </a:p>
+        </p:txBody>
+      </p:sp>
+      <p:sp>
+        <p:nvSpPr>
+          <p:cNvPr id="3" name="Text Placeholder 2">
+            <a:extLst>
+              <a:ext uri="{FF2B5EF4-FFF2-40B4-BE49-F238E27FC236}">
+                <a16:creationId xmlns:a16="http://schemas.microsoft.com/office/drawing/2014/main" id="{ECC2CEED-2A2D-C447-B2B7-1D4FB84B9C7D}"/>
+              </a:ext>
+            </a:extLst>
+          </p:cNvPr>
+          <p:cNvSpPr>
+            <a:spLocks noGrp="1"/>
+          </p:cNvSpPr>
+          <p:nvPr>
+            <p:ph type="body" idx="1"/>
+          </p:nvPr>
+        </p:nvSpPr>
+        <p:spPr/>
+        <p:txBody>
+          <a:bodyPr/>
+          <a:lstStyle/>
+          <a:p>
+            <a:endParaRPr lang="en-US" dirty="0"/>
+          </a:p>
+        </p:txBody>
+      </p:sp>
+    </p:spTree>
+    <p:extLst>
+      <p:ext uri="{BB962C8B-B14F-4D97-AF65-F5344CB8AC3E}">
+        <p14:creationId xmlns:p14="http://schemas.microsoft.com/office/powerpoint/2010/main" val="3119826879"/>
+      </p:ext>
+    </p:extLst>
+  </p:cSld>
+  <p:clrMapOvr>
+    <a:masterClrMapping/>
+  </p:clrMapOvr>
+</p:sld>
+</file>
+
+<file path=ppt/slides/slide17.xml><?xml version="1.0" encoding="utf-8"?>
+<p:sld xmlns:a="http://schemas.openxmlformats.org/drawingml/2006/main" xmlns:r="http://schemas.openxmlformats.org/officeDocument/2006/relationships" xmlns:p="http://schemas.openxmlformats.org/presentationml/2006/main">
+  <p:cSld>
+    <p:spTree>
+      <p:nvGrpSpPr>
+        <p:cNvPr id="1" name=""/>
+        <p:cNvGrpSpPr/>
+        <p:nvPr/>
+      </p:nvGrpSpPr>
+      <p:grpSpPr>
+        <a:xfrm>
+          <a:off x="0" y="0"/>
+          <a:ext cx="0" cy="0"/>
+          <a:chOff x="0" y="0"/>
+          <a:chExt cx="0" cy="0"/>
+        </a:xfrm>
+      </p:grpSpPr>
+      <p:sp>
+        <p:nvSpPr>
+          <p:cNvPr id="2" name="Title 1">
+            <a:extLst>
+              <a:ext uri="{FF2B5EF4-FFF2-40B4-BE49-F238E27FC236}">
+                <a16:creationId xmlns:a16="http://schemas.microsoft.com/office/drawing/2014/main" id="{4C587786-7B86-3648-9217-B24DAD784430}"/>
+              </a:ext>
+            </a:extLst>
+          </p:cNvPr>
+          <p:cNvSpPr>
+            <a:spLocks noGrp="1"/>
+          </p:cNvSpPr>
+          <p:nvPr>
+            <p:ph type="title"/>
+          </p:nvPr>
+        </p:nvSpPr>
+        <p:spPr/>
+        <p:txBody>
+          <a:bodyPr/>
+          <a:lstStyle/>
+          <a:p>
+            <a:r>
+              <a:rPr lang="en-US" dirty="0"/>
+              <a:t>Inference, variable selection, prediction</a:t>
+            </a:r>
+          </a:p>
+        </p:txBody>
+      </p:sp>
+      <p:sp>
+        <p:nvSpPr>
+          <p:cNvPr id="3" name="Text Placeholder 2">
+            <a:extLst>
+              <a:ext uri="{FF2B5EF4-FFF2-40B4-BE49-F238E27FC236}">
+                <a16:creationId xmlns:a16="http://schemas.microsoft.com/office/drawing/2014/main" id="{A1E26029-5221-4946-8579-B21FBFACCEC5}"/>
+              </a:ext>
+            </a:extLst>
+          </p:cNvPr>
+          <p:cNvSpPr>
+            <a:spLocks noGrp="1"/>
+          </p:cNvSpPr>
+          <p:nvPr>
+            <p:ph type="body" idx="1"/>
+          </p:nvPr>
+        </p:nvSpPr>
+        <p:spPr/>
+        <p:txBody>
+          <a:bodyPr/>
+          <a:lstStyle/>
+          <a:p>
+            <a:r>
+              <a:rPr lang="en-US" dirty="0"/>
+              <a:t>Borrowing from data science! Lots of ecologists and evolutionary biologists use prediction and inference interchangeably (I think this is a mistake!)</a:t>
+            </a:r>
+          </a:p>
+          <a:p>
+            <a:endParaRPr lang="en-US" dirty="0"/>
+          </a:p>
+        </p:txBody>
+      </p:sp>
+    </p:spTree>
+    <p:extLst>
+      <p:ext uri="{BB962C8B-B14F-4D97-AF65-F5344CB8AC3E}">
+        <p14:creationId xmlns:p14="http://schemas.microsoft.com/office/powerpoint/2010/main" val="2972157648"/>
+      </p:ext>
+    </p:extLst>
+  </p:cSld>
+  <p:clrMapOvr>
+    <a:masterClrMapping/>
+  </p:clrMapOvr>
+</p:sld>
+</file>
+
+<file path=ppt/slides/slide18.xml><?xml version="1.0" encoding="utf-8"?>
+<p:sld xmlns:a="http://schemas.openxmlformats.org/drawingml/2006/main" xmlns:r="http://schemas.openxmlformats.org/officeDocument/2006/relationships" xmlns:p="http://schemas.openxmlformats.org/presentationml/2006/main">
+  <p:cSld>
+    <p:spTree>
+      <p:nvGrpSpPr>
+        <p:cNvPr id="1" name=""/>
+        <p:cNvGrpSpPr/>
+        <p:nvPr/>
+      </p:nvGrpSpPr>
+      <p:grpSpPr>
+        <a:xfrm>
+          <a:off x="0" y="0"/>
+          <a:ext cx="0" cy="0"/>
+          <a:chOff x="0" y="0"/>
+          <a:chExt cx="0" cy="0"/>
+        </a:xfrm>
+      </p:grpSpPr>
+      <p:sp>
+        <p:nvSpPr>
+          <p:cNvPr id="2" name="Title 1">
+            <a:extLst>
+              <a:ext uri="{FF2B5EF4-FFF2-40B4-BE49-F238E27FC236}">
+                <a16:creationId xmlns:a16="http://schemas.microsoft.com/office/drawing/2014/main" id="{E4F62BE0-8427-564B-AA43-0400D175679A}"/>
+              </a:ext>
+            </a:extLst>
+          </p:cNvPr>
+          <p:cNvSpPr>
+            <a:spLocks noGrp="1"/>
+          </p:cNvSpPr>
+          <p:nvPr>
+            <p:ph type="title"/>
+          </p:nvPr>
+        </p:nvSpPr>
+        <p:spPr/>
+        <p:txBody>
+          <a:bodyPr/>
+          <a:lstStyle/>
+          <a:p>
+            <a:r>
+              <a:rPr lang="en-US" dirty="0"/>
+              <a:t>COFFEE</a:t>
+            </a:r>
+          </a:p>
+        </p:txBody>
+      </p:sp>
+      <p:sp>
+        <p:nvSpPr>
+          <p:cNvPr id="3" name="Text Placeholder 2">
+            <a:extLst>
+              <a:ext uri="{FF2B5EF4-FFF2-40B4-BE49-F238E27FC236}">
+                <a16:creationId xmlns:a16="http://schemas.microsoft.com/office/drawing/2014/main" id="{2572279A-6AAB-6646-900E-A7E70E40DA39}"/>
+              </a:ext>
+            </a:extLst>
+          </p:cNvPr>
+          <p:cNvSpPr>
+            <a:spLocks noGrp="1"/>
+          </p:cNvSpPr>
+          <p:nvPr>
+            <p:ph type="body" idx="1"/>
+          </p:nvPr>
+        </p:nvSpPr>
+        <p:spPr/>
+        <p:txBody>
+          <a:bodyPr/>
+          <a:lstStyle/>
+          <a:p>
+            <a:endParaRPr lang="en-US"/>
+          </a:p>
+        </p:txBody>
+      </p:sp>
+    </p:spTree>
+    <p:extLst>
+      <p:ext uri="{BB962C8B-B14F-4D97-AF65-F5344CB8AC3E}">
+        <p14:creationId xmlns:p14="http://schemas.microsoft.com/office/powerpoint/2010/main" val="3378957188"/>
+      </p:ext>
+    </p:extLst>
+  </p:cSld>
+  <p:clrMapOvr>
+    <a:masterClrMapping/>
+  </p:clrMapOvr>
+</p:sld>
+</file>
+
+<file path=ppt/slides/slide19.xml><?xml version="1.0" encoding="utf-8"?>
 <p:sld xmlns:a="http://schemas.openxmlformats.org/drawingml/2006/main" xmlns:r="http://schemas.openxmlformats.org/officeDocument/2006/relationships" xmlns:p="http://schemas.openxmlformats.org/presentationml/2006/main">
   <p:cSld>
     <p:spTree>
@@ -20836,7 +21241,181 @@
 </p:sld>
 </file>
 
-<file path=ppt/slides/slide14.xml><?xml version="1.0" encoding="utf-8"?>
+<file path=ppt/slides/slide2.xml><?xml version="1.0" encoding="utf-8"?>
+<p:sld xmlns:a="http://schemas.openxmlformats.org/drawingml/2006/main" xmlns:r="http://schemas.openxmlformats.org/officeDocument/2006/relationships" xmlns:p="http://schemas.openxmlformats.org/presentationml/2006/main">
+  <p:cSld>
+    <p:spTree>
+      <p:nvGrpSpPr>
+        <p:cNvPr id="1" name="Shape 173"/>
+        <p:cNvGrpSpPr/>
+        <p:nvPr/>
+      </p:nvGrpSpPr>
+      <p:grpSpPr>
+        <a:xfrm>
+          <a:off x="0" y="0"/>
+          <a:ext cx="0" cy="0"/>
+          <a:chOff x="0" y="0"/>
+          <a:chExt cx="0" cy="0"/>
+        </a:xfrm>
+      </p:grpSpPr>
+      <p:sp>
+        <p:nvSpPr>
+          <p:cNvPr id="174" name="Google Shape;174;p2"/>
+          <p:cNvSpPr txBox="1">
+            <a:spLocks noGrp="1"/>
+          </p:cNvSpPr>
+          <p:nvPr>
+            <p:ph type="title"/>
+          </p:nvPr>
+        </p:nvSpPr>
+        <p:spPr>
+          <a:xfrm>
+            <a:off x="2592925" y="624110"/>
+            <a:ext cx="8911687" cy="1280890"/>
+          </a:xfrm>
+          <a:prstGeom prst="rect">
+            <a:avLst/>
+          </a:prstGeom>
+          <a:noFill/>
+          <a:ln>
+            <a:noFill/>
+          </a:ln>
+        </p:spPr>
+        <p:txBody>
+          <a:bodyPr spcFirstLastPara="1" wrap="square" lIns="91425" tIns="45700" rIns="91425" bIns="45700" anchor="t" anchorCtr="0">
+            <a:normAutofit/>
+          </a:bodyPr>
+          <a:lstStyle/>
+          <a:p>
+            <a:pPr marL="0" lvl="0" indent="0" algn="l" rtl="0">
+              <a:spcBef>
+                <a:spcPts val="0"/>
+              </a:spcBef>
+              <a:spcAft>
+                <a:spcPts val="0"/>
+              </a:spcAft>
+              <a:buClr>
+                <a:srgbClr val="262626"/>
+              </a:buClr>
+              <a:buSzPts val="3600"/>
+              <a:buFont typeface="Century Gothic"/>
+              <a:buNone/>
+            </a:pPr>
+            <a:r>
+              <a:rPr lang="en-US"/>
+              <a:t>Today we’re going to:</a:t>
+            </a:r>
+            <a:endParaRPr/>
+          </a:p>
+        </p:txBody>
+      </p:sp>
+      <p:sp>
+        <p:nvSpPr>
+          <p:cNvPr id="175" name="Google Shape;175;p2"/>
+          <p:cNvSpPr txBox="1">
+            <a:spLocks noGrp="1"/>
+          </p:cNvSpPr>
+          <p:nvPr>
+            <p:ph type="body" idx="1"/>
+          </p:nvPr>
+        </p:nvSpPr>
+        <p:spPr>
+          <a:xfrm>
+            <a:off x="2589212" y="2133600"/>
+            <a:ext cx="8915400" cy="3777622"/>
+          </a:xfrm>
+          <a:prstGeom prst="rect">
+            <a:avLst/>
+          </a:prstGeom>
+          <a:noFill/>
+          <a:ln>
+            <a:noFill/>
+          </a:ln>
+        </p:spPr>
+        <p:txBody>
+          <a:bodyPr spcFirstLastPara="1" wrap="square" lIns="91425" tIns="45700" rIns="91425" bIns="45700" anchor="t" anchorCtr="0">
+            <a:normAutofit/>
+          </a:bodyPr>
+          <a:lstStyle/>
+          <a:p>
+            <a:pPr marL="342900" lvl="0" indent="-342900" algn="l" rtl="0">
+              <a:spcBef>
+                <a:spcPts val="0"/>
+              </a:spcBef>
+              <a:spcAft>
+                <a:spcPts val="0"/>
+              </a:spcAft>
+              <a:buSzPts val="1800"/>
+              <a:buChar char="🠶"/>
+            </a:pPr>
+            <a:r>
+              <a:rPr lang="en-US"/>
+              <a:t>Go over learning objectives of the class</a:t>
+            </a:r>
+            <a:endParaRPr/>
+          </a:p>
+          <a:p>
+            <a:pPr marL="342900" lvl="0" indent="-342900" algn="l" rtl="0">
+              <a:spcBef>
+                <a:spcPts val="1000"/>
+              </a:spcBef>
+              <a:spcAft>
+                <a:spcPts val="0"/>
+              </a:spcAft>
+              <a:buSzPts val="1800"/>
+              <a:buChar char="🠶"/>
+            </a:pPr>
+            <a:r>
+              <a:rPr lang="en-US"/>
+              <a:t>Talk about the basic philosophy of (frequentist) statistics</a:t>
+            </a:r>
+            <a:endParaRPr/>
+          </a:p>
+          <a:p>
+            <a:pPr marL="342900" lvl="0" indent="-342900" algn="l" rtl="0">
+              <a:spcBef>
+                <a:spcPts val="1000"/>
+              </a:spcBef>
+              <a:spcAft>
+                <a:spcPts val="0"/>
+              </a:spcAft>
+              <a:buSzPts val="1800"/>
+              <a:buChar char="🠶"/>
+            </a:pPr>
+            <a:r>
+              <a:rPr lang="en-US"/>
+              <a:t>Talk about the use of simulations, and the summative assessment</a:t>
+            </a:r>
+            <a:endParaRPr/>
+          </a:p>
+          <a:p>
+            <a:pPr marL="342900" lvl="0" indent="-342900" algn="l" rtl="0">
+              <a:spcBef>
+                <a:spcPts val="1000"/>
+              </a:spcBef>
+              <a:spcAft>
+                <a:spcPts val="0"/>
+              </a:spcAft>
+              <a:buSzPts val="1800"/>
+              <a:buChar char="🠶"/>
+            </a:pPr>
+            <a:r>
+              <a:rPr lang="en-US"/>
+              <a:t>Interpret some methods sections of scientific papers in groups</a:t>
+            </a:r>
+            <a:endParaRPr/>
+          </a:p>
+        </p:txBody>
+      </p:sp>
+    </p:spTree>
+  </p:cSld>
+  <p:clrMapOvr>
+    <a:masterClrMapping/>
+  </p:clrMapOvr>
+</p:sld>
+</file>
+
+<file path=ppt/slides/slide20.xml><?xml version="1.0" encoding="utf-8"?>
 <p:sld xmlns:a="http://schemas.openxmlformats.org/drawingml/2006/main" xmlns:r="http://schemas.openxmlformats.org/officeDocument/2006/relationships" xmlns:p="http://schemas.openxmlformats.org/presentationml/2006/main">
   <p:cSld>
     <p:spTree>
@@ -20930,7 +21509,7 @@
 </p:sld>
 </file>
 
-<file path=ppt/slides/slide15.xml><?xml version="1.0" encoding="utf-8"?>
+<file path=ppt/slides/slide21.xml><?xml version="1.0" encoding="utf-8"?>
 <p:sld xmlns:a="http://schemas.openxmlformats.org/drawingml/2006/main" xmlns:r="http://schemas.openxmlformats.org/officeDocument/2006/relationships" xmlns:p="http://schemas.openxmlformats.org/presentationml/2006/main">
   <p:cSld>
     <p:spTree>
@@ -21030,7 +21609,7 @@
 </p:sld>
 </file>
 
-<file path=ppt/slides/slide16.xml><?xml version="1.0" encoding="utf-8"?>
+<file path=ppt/slides/slide22.xml><?xml version="1.0" encoding="utf-8"?>
 <p:sld xmlns:a="http://schemas.openxmlformats.org/drawingml/2006/main" xmlns:r="http://schemas.openxmlformats.org/officeDocument/2006/relationships" xmlns:p="http://schemas.openxmlformats.org/presentationml/2006/main">
   <p:cSld>
     <p:spTree>
@@ -21142,7 +21721,7 @@
 </p:sld>
 </file>
 
-<file path=ppt/slides/slide17.xml><?xml version="1.0" encoding="utf-8"?>
+<file path=ppt/slides/slide23.xml><?xml version="1.0" encoding="utf-8"?>
 <p:sld xmlns:a="http://schemas.openxmlformats.org/drawingml/2006/main" xmlns:r="http://schemas.openxmlformats.org/officeDocument/2006/relationships" xmlns:p="http://schemas.openxmlformats.org/presentationml/2006/main">
   <p:cSld>
     <p:spTree>
@@ -21260,7 +21839,7 @@
 </p:sld>
 </file>
 
-<file path=ppt/slides/slide18.xml><?xml version="1.0" encoding="utf-8"?>
+<file path=ppt/slides/slide24.xml><?xml version="1.0" encoding="utf-8"?>
 <p:sld xmlns:a="http://schemas.openxmlformats.org/drawingml/2006/main" xmlns:r="http://schemas.openxmlformats.org/officeDocument/2006/relationships" xmlns:p="http://schemas.openxmlformats.org/presentationml/2006/main">
   <p:cSld>
     <p:spTree>
@@ -21378,7 +21957,7 @@
 </p:sld>
 </file>
 
-<file path=ppt/slides/slide19.xml><?xml version="1.0" encoding="utf-8"?>
+<file path=ppt/slides/slide25.xml><?xml version="1.0" encoding="utf-8"?>
 <p:sld xmlns:a="http://schemas.openxmlformats.org/drawingml/2006/main" xmlns:r="http://schemas.openxmlformats.org/officeDocument/2006/relationships" xmlns:p="http://schemas.openxmlformats.org/presentationml/2006/main">
   <p:cSld>
     <p:spTree>
@@ -21611,180 +22190,6 @@
 </p:sld>
 </file>
 
-<file path=ppt/slides/slide2.xml><?xml version="1.0" encoding="utf-8"?>
-<p:sld xmlns:a="http://schemas.openxmlformats.org/drawingml/2006/main" xmlns:r="http://schemas.openxmlformats.org/officeDocument/2006/relationships" xmlns:p="http://schemas.openxmlformats.org/presentationml/2006/main">
-  <p:cSld>
-    <p:spTree>
-      <p:nvGrpSpPr>
-        <p:cNvPr id="1" name="Shape 173"/>
-        <p:cNvGrpSpPr/>
-        <p:nvPr/>
-      </p:nvGrpSpPr>
-      <p:grpSpPr>
-        <a:xfrm>
-          <a:off x="0" y="0"/>
-          <a:ext cx="0" cy="0"/>
-          <a:chOff x="0" y="0"/>
-          <a:chExt cx="0" cy="0"/>
-        </a:xfrm>
-      </p:grpSpPr>
-      <p:sp>
-        <p:nvSpPr>
-          <p:cNvPr id="174" name="Google Shape;174;p2"/>
-          <p:cNvSpPr txBox="1">
-            <a:spLocks noGrp="1"/>
-          </p:cNvSpPr>
-          <p:nvPr>
-            <p:ph type="title"/>
-          </p:nvPr>
-        </p:nvSpPr>
-        <p:spPr>
-          <a:xfrm>
-            <a:off x="2592925" y="624110"/>
-            <a:ext cx="8911687" cy="1280890"/>
-          </a:xfrm>
-          <a:prstGeom prst="rect">
-            <a:avLst/>
-          </a:prstGeom>
-          <a:noFill/>
-          <a:ln>
-            <a:noFill/>
-          </a:ln>
-        </p:spPr>
-        <p:txBody>
-          <a:bodyPr spcFirstLastPara="1" wrap="square" lIns="91425" tIns="45700" rIns="91425" bIns="45700" anchor="t" anchorCtr="0">
-            <a:normAutofit/>
-          </a:bodyPr>
-          <a:lstStyle/>
-          <a:p>
-            <a:pPr marL="0" lvl="0" indent="0" algn="l" rtl="0">
-              <a:spcBef>
-                <a:spcPts val="0"/>
-              </a:spcBef>
-              <a:spcAft>
-                <a:spcPts val="0"/>
-              </a:spcAft>
-              <a:buClr>
-                <a:srgbClr val="262626"/>
-              </a:buClr>
-              <a:buSzPts val="3600"/>
-              <a:buFont typeface="Century Gothic"/>
-              <a:buNone/>
-            </a:pPr>
-            <a:r>
-              <a:rPr lang="en-US"/>
-              <a:t>Today we’re going to:</a:t>
-            </a:r>
-            <a:endParaRPr/>
-          </a:p>
-        </p:txBody>
-      </p:sp>
-      <p:sp>
-        <p:nvSpPr>
-          <p:cNvPr id="175" name="Google Shape;175;p2"/>
-          <p:cNvSpPr txBox="1">
-            <a:spLocks noGrp="1"/>
-          </p:cNvSpPr>
-          <p:nvPr>
-            <p:ph type="body" idx="1"/>
-          </p:nvPr>
-        </p:nvSpPr>
-        <p:spPr>
-          <a:xfrm>
-            <a:off x="2589212" y="2133600"/>
-            <a:ext cx="8915400" cy="3777622"/>
-          </a:xfrm>
-          <a:prstGeom prst="rect">
-            <a:avLst/>
-          </a:prstGeom>
-          <a:noFill/>
-          <a:ln>
-            <a:noFill/>
-          </a:ln>
-        </p:spPr>
-        <p:txBody>
-          <a:bodyPr spcFirstLastPara="1" wrap="square" lIns="91425" tIns="45700" rIns="91425" bIns="45700" anchor="t" anchorCtr="0">
-            <a:normAutofit/>
-          </a:bodyPr>
-          <a:lstStyle/>
-          <a:p>
-            <a:pPr marL="342900" lvl="0" indent="-342900" algn="l" rtl="0">
-              <a:spcBef>
-                <a:spcPts val="0"/>
-              </a:spcBef>
-              <a:spcAft>
-                <a:spcPts val="0"/>
-              </a:spcAft>
-              <a:buSzPts val="1800"/>
-              <a:buChar char="🠶"/>
-            </a:pPr>
-            <a:r>
-              <a:rPr lang="en-US"/>
-              <a:t>Go over learning objectives of the class</a:t>
-            </a:r>
-            <a:endParaRPr/>
-          </a:p>
-          <a:p>
-            <a:pPr marL="342900" lvl="0" indent="-342900" algn="l" rtl="0">
-              <a:spcBef>
-                <a:spcPts val="1000"/>
-              </a:spcBef>
-              <a:spcAft>
-                <a:spcPts val="0"/>
-              </a:spcAft>
-              <a:buSzPts val="1800"/>
-              <a:buChar char="🠶"/>
-            </a:pPr>
-            <a:r>
-              <a:rPr lang="en-US"/>
-              <a:t>Talk about the basic philosophy of (frequentist) statistics</a:t>
-            </a:r>
-            <a:endParaRPr/>
-          </a:p>
-          <a:p>
-            <a:pPr marL="342900" lvl="0" indent="-342900" algn="l" rtl="0">
-              <a:spcBef>
-                <a:spcPts val="1000"/>
-              </a:spcBef>
-              <a:spcAft>
-                <a:spcPts val="0"/>
-              </a:spcAft>
-              <a:buSzPts val="1800"/>
-              <a:buChar char="🠶"/>
-            </a:pPr>
-            <a:r>
-              <a:rPr lang="en-US"/>
-              <a:t>Talk about the use of simulations, and the summative assessment</a:t>
-            </a:r>
-            <a:endParaRPr/>
-          </a:p>
-          <a:p>
-            <a:pPr marL="342900" lvl="0" indent="-342900" algn="l" rtl="0">
-              <a:spcBef>
-                <a:spcPts val="1000"/>
-              </a:spcBef>
-              <a:spcAft>
-                <a:spcPts val="0"/>
-              </a:spcAft>
-              <a:buSzPts val="1800"/>
-              <a:buChar char="🠶"/>
-            </a:pPr>
-            <a:r>
-              <a:rPr lang="en-US"/>
-              <a:t>Interpret some methods sections of scientific papers in groups</a:t>
-            </a:r>
-            <a:endParaRPr/>
-          </a:p>
-        </p:txBody>
-      </p:sp>
-    </p:spTree>
-  </p:cSld>
-  <p:clrMapOvr>
-    <a:masterClrMapping/>
-  </p:clrMapOvr>
-</p:sld>
-</file>
-
 <file path=ppt/slides/slide3.xml><?xml version="1.0" encoding="utf-8"?>
 <p:sld xmlns:a="http://schemas.openxmlformats.org/drawingml/2006/main" xmlns:r="http://schemas.openxmlformats.org/officeDocument/2006/relationships" xmlns:p="http://schemas.openxmlformats.org/presentationml/2006/main">
   <p:cSld>
@@ -22736,79 +23141,34 @@
       </p:sp>
       <p:pic>
         <p:nvPicPr>
-          <p:cNvPr id="206" name="Google Shape;206;p7" descr="A black background with a black square&#10;&#10;Description automatically generated with medium confidence"/>
-          <p:cNvPicPr preferRelativeResize="0"/>
+          <p:cNvPr id="3" name="Picture 2" descr="A black background with a black square&#10;&#10;Description automatically generated with medium confidence">
+            <a:extLst>
+              <a:ext uri="{FF2B5EF4-FFF2-40B4-BE49-F238E27FC236}">
+                <a16:creationId xmlns:a16="http://schemas.microsoft.com/office/drawing/2014/main" id="{0885251C-0FCA-CC44-BE46-CCFDF279A5E8}"/>
+              </a:ext>
+            </a:extLst>
+          </p:cNvPr>
+          <p:cNvPicPr>
+            <a:picLocks noChangeAspect="1"/>
+          </p:cNvPicPr>
           <p:nvPr/>
         </p:nvPicPr>
-        <p:blipFill rotWithShape="1">
-          <a:blip r:embed="rId3">
-            <a:alphaModFix/>
-          </a:blip>
-          <a:srcRect/>
-          <a:stretch/>
+        <p:blipFill>
+          <a:blip r:embed="rId3"/>
+          <a:stretch>
+            <a:fillRect/>
+          </a:stretch>
         </p:blipFill>
         <p:spPr>
           <a:xfrm>
-            <a:off x="3394200" y="2805300"/>
-            <a:ext cx="5403600" cy="4052700"/>
+            <a:off x="3843548" y="2808000"/>
+            <a:ext cx="5399999" cy="4050000"/>
           </a:xfrm>
           <a:prstGeom prst="rect">
             <a:avLst/>
           </a:prstGeom>
-          <a:noFill/>
-          <a:ln>
-            <a:noFill/>
-          </a:ln>
         </p:spPr>
       </p:pic>
-      <p:sp>
-        <p:nvSpPr>
-          <p:cNvPr id="207" name="Google Shape;207;p7"/>
-          <p:cNvSpPr/>
-          <p:nvPr/>
-        </p:nvSpPr>
-        <p:spPr>
-          <a:xfrm>
-            <a:off x="7463481" y="4547286"/>
-            <a:ext cx="766119" cy="259492"/>
-          </a:xfrm>
-          <a:prstGeom prst="rect">
-            <a:avLst/>
-          </a:prstGeom>
-          <a:solidFill>
-            <a:schemeClr val="lt2"/>
-          </a:solidFill>
-          <a:ln>
-            <a:noFill/>
-          </a:ln>
-        </p:spPr>
-        <p:txBody>
-          <a:bodyPr spcFirstLastPara="1" wrap="square" lIns="91425" tIns="45700" rIns="91425" bIns="45700" anchor="ctr" anchorCtr="0">
-            <a:noAutofit/>
-          </a:bodyPr>
-          <a:lstStyle/>
-          <a:p>
-            <a:pPr marL="0" marR="0" lvl="0" indent="0" algn="ctr" rtl="0">
-              <a:spcBef>
-                <a:spcPts val="0"/>
-              </a:spcBef>
-              <a:spcAft>
-                <a:spcPts val="0"/>
-              </a:spcAft>
-              <a:buNone/>
-            </a:pPr>
-            <a:endParaRPr sz="1800" b="0" i="0" u="none" strike="noStrike" cap="none">
-              <a:solidFill>
-                <a:schemeClr val="lt1"/>
-              </a:solidFill>
-              <a:latin typeface="Century Gothic"/>
-              <a:ea typeface="Century Gothic"/>
-              <a:cs typeface="Century Gothic"/>
-              <a:sym typeface="Century Gothic"/>
-            </a:endParaRPr>
-          </a:p>
-        </p:txBody>
-      </p:sp>
     </p:spTree>
   </p:cSld>
   <p:clrMapOvr>

</xml_diff>

<commit_message>
updating some lecture slides
</commit_message>
<xml_diff>
--- a/Lecture1 _v2.pptx
+++ b/Lecture1 _v2.pptx
@@ -5,7 +5,7 @@
     <p:sldMasterId id="2147483648" r:id="rId1"/>
   </p:sldMasterIdLst>
   <p:notesMasterIdLst>
-    <p:notesMasterId r:id="rId29"/>
+    <p:notesMasterId r:id="rId31"/>
   </p:notesMasterIdLst>
   <p:sldIdLst>
     <p:sldId id="256" r:id="rId2"/>
@@ -14,44 +14,39 @@
     <p:sldId id="259" r:id="rId5"/>
     <p:sldId id="260" r:id="rId6"/>
     <p:sldId id="261" r:id="rId7"/>
-    <p:sldId id="268" r:id="rId8"/>
-    <p:sldId id="262" r:id="rId9"/>
-    <p:sldId id="263" r:id="rId10"/>
-    <p:sldId id="264" r:id="rId11"/>
-    <p:sldId id="275" r:id="rId12"/>
-    <p:sldId id="276" r:id="rId13"/>
-    <p:sldId id="280" r:id="rId14"/>
-    <p:sldId id="282" r:id="rId15"/>
-    <p:sldId id="281" r:id="rId16"/>
-    <p:sldId id="284" r:id="rId17"/>
-    <p:sldId id="285" r:id="rId18"/>
-    <p:sldId id="279" r:id="rId19"/>
-    <p:sldId id="269" r:id="rId20"/>
-    <p:sldId id="270" r:id="rId21"/>
-    <p:sldId id="271" r:id="rId22"/>
-    <p:sldId id="272" r:id="rId23"/>
-    <p:sldId id="273" r:id="rId24"/>
-    <p:sldId id="274" r:id="rId25"/>
-    <p:sldId id="286" r:id="rId26"/>
-    <p:sldId id="267" r:id="rId27"/>
-    <p:sldId id="283" r:id="rId28"/>
+    <p:sldId id="287" r:id="rId8"/>
+    <p:sldId id="288" r:id="rId9"/>
+    <p:sldId id="268" r:id="rId10"/>
+    <p:sldId id="262" r:id="rId11"/>
+    <p:sldId id="263" r:id="rId12"/>
+    <p:sldId id="264" r:id="rId13"/>
+    <p:sldId id="275" r:id="rId14"/>
+    <p:sldId id="276" r:id="rId15"/>
+    <p:sldId id="280" r:id="rId16"/>
+    <p:sldId id="282" r:id="rId17"/>
+    <p:sldId id="281" r:id="rId18"/>
+    <p:sldId id="284" r:id="rId19"/>
+    <p:sldId id="285" r:id="rId20"/>
+    <p:sldId id="279" r:id="rId21"/>
+    <p:sldId id="269" r:id="rId22"/>
+    <p:sldId id="270" r:id="rId23"/>
+    <p:sldId id="271" r:id="rId24"/>
+    <p:sldId id="272" r:id="rId25"/>
+    <p:sldId id="273" r:id="rId26"/>
+    <p:sldId id="274" r:id="rId27"/>
+    <p:sldId id="286" r:id="rId28"/>
+    <p:sldId id="267" r:id="rId29"/>
+    <p:sldId id="283" r:id="rId30"/>
   </p:sldIdLst>
   <p:sldSz cx="12192000" cy="6858000"/>
   <p:notesSz cx="6858000" cy="9144000"/>
   <p:embeddedFontLst>
     <p:embeddedFont>
-      <p:font typeface="Calibri" panose="020F0502020204030204" pitchFamily="34" charset="0"/>
-      <p:regular r:id="rId30"/>
-      <p:bold r:id="rId31"/>
-      <p:italic r:id="rId32"/>
-      <p:boldItalic r:id="rId33"/>
-    </p:embeddedFont>
-    <p:embeddedFont>
       <p:font typeface="Century Gothic" panose="020B0502020202020204" pitchFamily="34" charset="0"/>
-      <p:regular r:id="rId34"/>
-      <p:bold r:id="rId35"/>
-      <p:italic r:id="rId36"/>
-      <p:boldItalic r:id="rId37"/>
+      <p:regular r:id="rId32"/>
+      <p:bold r:id="rId33"/>
+      <p:italic r:id="rId34"/>
+      <p:boldItalic r:id="rId35"/>
     </p:embeddedFont>
   </p:embeddedFontLst>
   <p:defaultTextStyle>
@@ -288,7 +283,7 @@
       <p15:sldGuideLst xmlns:p15="http://schemas.microsoft.com/office/powerpoint/2012/main"/>
     </p:ext>
     <p:ext uri="GoogleSlidesCustomDataVersion2">
-      <go:slidesCustomData xmlns="" xmlns:mc="http://schemas.openxmlformats.org/markup-compatibility/2006" xmlns:mv="urn:schemas-microsoft-com:mac:vml" xmlns:c="http://schemas.openxmlformats.org/drawingml/2006/chart" xmlns:dgm="http://schemas.openxmlformats.org/drawingml/2006/diagram" xmlns:o="urn:schemas-microsoft-com:office:office" xmlns:v="urn:schemas-microsoft-com:vml" xmlns:pvml="urn:schemas-microsoft-com:office:powerpoint" xmlns:com="http://schemas.openxmlformats.org/drawingml/2006/compatibility" xmlns:p14="http://schemas.microsoft.com/office/powerpoint/2010/main" xmlns:p15="http://schemas.microsoft.com/office/powerpoint/2012/main" xmlns:ahyp="http://schemas.microsoft.com/office/drawing/2018/hyperlinkcolor" xmlns:go="http://customooxmlschemas.google.com/" r:id="rId38" roundtripDataSignature="AMtx7mhEk3kr15p5MvOwX8Siehu9UxAE2A=="/>
+      <go:slidesCustomData xmlns:go="http://customooxmlschemas.google.com/" xmlns:ahyp="http://schemas.microsoft.com/office/drawing/2018/hyperlinkcolor" xmlns:p15="http://schemas.microsoft.com/office/powerpoint/2012/main" xmlns:p14="http://schemas.microsoft.com/office/powerpoint/2010/main" xmlns:com="http://schemas.openxmlformats.org/drawingml/2006/compatibility" xmlns:pvml="urn:schemas-microsoft-com:office:powerpoint" xmlns:v="urn:schemas-microsoft-com:vml" xmlns:o="urn:schemas-microsoft-com:office:office" xmlns:dgm="http://schemas.openxmlformats.org/drawingml/2006/diagram" xmlns:c="http://schemas.openxmlformats.org/drawingml/2006/chart" xmlns:mv="urn:schemas-microsoft-com:mac:vml" xmlns:mc="http://schemas.openxmlformats.org/markup-compatibility/2006" xmlns="" r:id="rId38" roundtripDataSignature="AMtx7mhEk3kr15p5MvOwX8Siehu9UxAE2A=="/>
     </p:ext>
   </p:extLst>
 </p:presentation>
@@ -1694,7 +1689,7 @@
                 <a:cs typeface="Calibri"/>
                 <a:sym typeface="Calibri"/>
               </a:rPr>
-              <a:t>11</a:t>
+              <a:t>13</a:t>
             </a:fld>
             <a:endParaRPr lang="en-US" sz="1200" b="0" i="0" u="none" strike="noStrike" cap="none">
               <a:solidFill>
@@ -1815,7 +1810,7 @@
                 <a:cs typeface="Calibri"/>
                 <a:sym typeface="Calibri"/>
               </a:rPr>
-              <a:t>15</a:t>
+              <a:t>17</a:t>
             </a:fld>
             <a:endParaRPr lang="en-US" sz="1200" b="0" i="0" u="none" strike="noStrike" cap="none">
               <a:solidFill>
@@ -2620,7 +2615,7 @@
             </a:pPr>
             <a:fld id="{00000000-1234-1234-1234-123412341234}" type="slidenum">
               <a:rPr lang="en-US"/>
-              <a:t>9</a:t>
+              <a:t>11</a:t>
             </a:fld>
             <a:endParaRPr/>
           </a:p>
@@ -20306,6 +20301,374 @@
   <p:cSld>
     <p:spTree>
       <p:nvGrpSpPr>
+        <p:cNvPr id="1" name="Shape 203"/>
+        <p:cNvGrpSpPr/>
+        <p:nvPr/>
+      </p:nvGrpSpPr>
+      <p:grpSpPr>
+        <a:xfrm>
+          <a:off x="0" y="0"/>
+          <a:ext cx="0" cy="0"/>
+          <a:chOff x="0" y="0"/>
+          <a:chExt cx="0" cy="0"/>
+        </a:xfrm>
+      </p:grpSpPr>
+      <p:sp>
+        <p:nvSpPr>
+          <p:cNvPr id="204" name="Google Shape;204;p7"/>
+          <p:cNvSpPr txBox="1">
+            <a:spLocks noGrp="1"/>
+          </p:cNvSpPr>
+          <p:nvPr>
+            <p:ph type="title"/>
+          </p:nvPr>
+        </p:nvSpPr>
+        <p:spPr>
+          <a:xfrm>
+            <a:off x="2592925" y="624110"/>
+            <a:ext cx="8911687" cy="1280890"/>
+          </a:xfrm>
+          <a:prstGeom prst="rect">
+            <a:avLst/>
+          </a:prstGeom>
+          <a:noFill/>
+          <a:ln>
+            <a:noFill/>
+          </a:ln>
+        </p:spPr>
+        <p:txBody>
+          <a:bodyPr spcFirstLastPara="1" wrap="square" lIns="91425" tIns="45700" rIns="91425" bIns="45700" anchor="t" anchorCtr="0">
+            <a:normAutofit/>
+          </a:bodyPr>
+          <a:lstStyle/>
+          <a:p>
+            <a:pPr marL="0" lvl="0" indent="0" algn="l" rtl="0">
+              <a:spcBef>
+                <a:spcPts val="0"/>
+              </a:spcBef>
+              <a:spcAft>
+                <a:spcPts val="0"/>
+              </a:spcAft>
+              <a:buClr>
+                <a:srgbClr val="262626"/>
+              </a:buClr>
+              <a:buSzPts val="3600"/>
+              <a:buFont typeface="Century Gothic"/>
+              <a:buNone/>
+            </a:pPr>
+            <a:r>
+              <a:rPr lang="en-US"/>
+              <a:t>Linear models</a:t>
+            </a:r>
+            <a:endParaRPr/>
+          </a:p>
+        </p:txBody>
+      </p:sp>
+      <p:sp>
+        <p:nvSpPr>
+          <p:cNvPr id="205" name="Google Shape;205;p7"/>
+          <p:cNvSpPr txBox="1">
+            <a:spLocks noGrp="1"/>
+          </p:cNvSpPr>
+          <p:nvPr>
+            <p:ph type="body" idx="1"/>
+          </p:nvPr>
+        </p:nvSpPr>
+        <p:spPr>
+          <a:xfrm>
+            <a:off x="2589212" y="2133600"/>
+            <a:ext cx="8915400" cy="3777622"/>
+          </a:xfrm>
+          <a:prstGeom prst="rect">
+            <a:avLst/>
+          </a:prstGeom>
+          <a:noFill/>
+          <a:ln>
+            <a:noFill/>
+          </a:ln>
+        </p:spPr>
+        <p:txBody>
+          <a:bodyPr spcFirstLastPara="1" wrap="square" lIns="91425" tIns="45700" rIns="91425" bIns="45700" anchor="t" anchorCtr="0">
+            <a:normAutofit/>
+          </a:bodyPr>
+          <a:lstStyle/>
+          <a:p>
+            <a:pPr marL="342900" lvl="0" indent="-342900" algn="l" rtl="0">
+              <a:spcBef>
+                <a:spcPts val="0"/>
+              </a:spcBef>
+              <a:spcAft>
+                <a:spcPts val="0"/>
+              </a:spcAft>
+              <a:buSzPts val="1800"/>
+              <a:buChar char="🠶"/>
+            </a:pPr>
+            <a:r>
+              <a:rPr lang="en-US"/>
+              <a:t>Most statistical tests are special cases of a linear model</a:t>
+            </a:r>
+            <a:endParaRPr/>
+          </a:p>
+          <a:p>
+            <a:pPr marL="342900" lvl="0" indent="-342900" algn="l" rtl="0">
+              <a:spcBef>
+                <a:spcPts val="1000"/>
+              </a:spcBef>
+              <a:spcAft>
+                <a:spcPts val="0"/>
+              </a:spcAft>
+              <a:buSzPts val="1800"/>
+              <a:buChar char="🠶"/>
+            </a:pPr>
+            <a:r>
+              <a:rPr lang="en-US"/>
+              <a:t>Once you understand a linear model, you can work out the appropriate test</a:t>
+            </a:r>
+            <a:endParaRPr/>
+          </a:p>
+        </p:txBody>
+      </p:sp>
+      <p:pic>
+        <p:nvPicPr>
+          <p:cNvPr id="3" name="Picture 2" descr="A black background with a black square&#10;&#10;Description automatically generated with medium confidence">
+            <a:extLst>
+              <a:ext uri="{FF2B5EF4-FFF2-40B4-BE49-F238E27FC236}">
+                <a16:creationId xmlns:a16="http://schemas.microsoft.com/office/drawing/2014/main" id="{0885251C-0FCA-CC44-BE46-CCFDF279A5E8}"/>
+              </a:ext>
+            </a:extLst>
+          </p:cNvPr>
+          <p:cNvPicPr>
+            <a:picLocks noChangeAspect="1"/>
+          </p:cNvPicPr>
+          <p:nvPr/>
+        </p:nvPicPr>
+        <p:blipFill>
+          <a:blip r:embed="rId3"/>
+          <a:stretch>
+            <a:fillRect/>
+          </a:stretch>
+        </p:blipFill>
+        <p:spPr>
+          <a:xfrm>
+            <a:off x="3843548" y="2808000"/>
+            <a:ext cx="5399999" cy="4050000"/>
+          </a:xfrm>
+          <a:prstGeom prst="rect">
+            <a:avLst/>
+          </a:prstGeom>
+        </p:spPr>
+      </p:pic>
+    </p:spTree>
+  </p:cSld>
+  <p:clrMapOvr>
+    <a:masterClrMapping/>
+  </p:clrMapOvr>
+</p:sld>
+</file>
+
+<file path=ppt/slides/slide11.xml><?xml version="1.0" encoding="utf-8"?>
+<p:sld xmlns:a="http://schemas.openxmlformats.org/drawingml/2006/main" xmlns:r="http://schemas.openxmlformats.org/officeDocument/2006/relationships" xmlns:p="http://schemas.openxmlformats.org/presentationml/2006/main">
+  <p:cSld>
+    <p:spTree>
+      <p:nvGrpSpPr>
+        <p:cNvPr id="1" name="Shape 212"/>
+        <p:cNvGrpSpPr/>
+        <p:nvPr/>
+      </p:nvGrpSpPr>
+      <p:grpSpPr>
+        <a:xfrm>
+          <a:off x="0" y="0"/>
+          <a:ext cx="0" cy="0"/>
+          <a:chOff x="0" y="0"/>
+          <a:chExt cx="0" cy="0"/>
+        </a:xfrm>
+      </p:grpSpPr>
+      <p:sp>
+        <p:nvSpPr>
+          <p:cNvPr id="213" name="Google Shape;213;p8"/>
+          <p:cNvSpPr txBox="1">
+            <a:spLocks noGrp="1"/>
+          </p:cNvSpPr>
+          <p:nvPr>
+            <p:ph type="title"/>
+          </p:nvPr>
+        </p:nvSpPr>
+        <p:spPr>
+          <a:xfrm>
+            <a:off x="2592925" y="624110"/>
+            <a:ext cx="8911687" cy="1280890"/>
+          </a:xfrm>
+          <a:prstGeom prst="rect">
+            <a:avLst/>
+          </a:prstGeom>
+          <a:noFill/>
+          <a:ln>
+            <a:noFill/>
+          </a:ln>
+        </p:spPr>
+        <p:txBody>
+          <a:bodyPr spcFirstLastPara="1" wrap="square" lIns="91425" tIns="45700" rIns="91425" bIns="45700" anchor="t" anchorCtr="0">
+            <a:normAutofit/>
+          </a:bodyPr>
+          <a:lstStyle/>
+          <a:p>
+            <a:pPr marL="0" lvl="0" indent="0" algn="l" rtl="0">
+              <a:spcBef>
+                <a:spcPts val="0"/>
+              </a:spcBef>
+              <a:spcAft>
+                <a:spcPts val="0"/>
+              </a:spcAft>
+              <a:buClr>
+                <a:srgbClr val="262626"/>
+              </a:buClr>
+              <a:buSzPts val="3600"/>
+              <a:buFont typeface="Century Gothic"/>
+              <a:buNone/>
+            </a:pPr>
+            <a:r>
+              <a:rPr lang="en-US"/>
+              <a:t>Linear models</a:t>
+            </a:r>
+            <a:endParaRPr/>
+          </a:p>
+        </p:txBody>
+      </p:sp>
+      <p:sp>
+        <p:nvSpPr>
+          <p:cNvPr id="214" name="Google Shape;214;p8"/>
+          <p:cNvSpPr txBox="1">
+            <a:spLocks noGrp="1"/>
+          </p:cNvSpPr>
+          <p:nvPr>
+            <p:ph type="body" idx="1"/>
+          </p:nvPr>
+        </p:nvSpPr>
+        <p:spPr>
+          <a:xfrm>
+            <a:off x="2589212" y="2133600"/>
+            <a:ext cx="8915400" cy="3777622"/>
+          </a:xfrm>
+          <a:prstGeom prst="rect">
+            <a:avLst/>
+          </a:prstGeom>
+          <a:noFill/>
+          <a:ln>
+            <a:noFill/>
+          </a:ln>
+        </p:spPr>
+        <p:txBody>
+          <a:bodyPr spcFirstLastPara="1" wrap="square" lIns="91425" tIns="45700" rIns="91425" bIns="45700" anchor="t" anchorCtr="0">
+            <a:normAutofit/>
+          </a:bodyPr>
+          <a:lstStyle/>
+          <a:p>
+            <a:pPr marL="342900" lvl="0" indent="-342900" algn="l" rtl="0">
+              <a:spcBef>
+                <a:spcPts val="0"/>
+              </a:spcBef>
+              <a:spcAft>
+                <a:spcPts val="0"/>
+              </a:spcAft>
+              <a:buSzPts val="1800"/>
+              <a:buChar char="🠶"/>
+            </a:pPr>
+            <a:r>
+              <a:rPr lang="en-US"/>
+              <a:t>Another way to think about this is, what do I think the underlying distributions of each data set is here?</a:t>
+            </a:r>
+            <a:endParaRPr/>
+          </a:p>
+        </p:txBody>
+      </p:sp>
+      <p:sp>
+        <p:nvSpPr>
+          <p:cNvPr id="215" name="Google Shape;215;p8"/>
+          <p:cNvSpPr/>
+          <p:nvPr/>
+        </p:nvSpPr>
+        <p:spPr>
+          <a:xfrm>
+            <a:off x="7463481" y="4547286"/>
+            <a:ext cx="766119" cy="259492"/>
+          </a:xfrm>
+          <a:prstGeom prst="rect">
+            <a:avLst/>
+          </a:prstGeom>
+          <a:solidFill>
+            <a:schemeClr val="lt1"/>
+          </a:solidFill>
+          <a:ln>
+            <a:noFill/>
+          </a:ln>
+        </p:spPr>
+        <p:txBody>
+          <a:bodyPr spcFirstLastPara="1" wrap="square" lIns="91425" tIns="45700" rIns="91425" bIns="45700" anchor="ctr" anchorCtr="0">
+            <a:noAutofit/>
+          </a:bodyPr>
+          <a:lstStyle/>
+          <a:p>
+            <a:pPr marL="0" marR="0" lvl="0" indent="0" algn="ctr" rtl="0">
+              <a:spcBef>
+                <a:spcPts val="0"/>
+              </a:spcBef>
+              <a:spcAft>
+                <a:spcPts val="0"/>
+              </a:spcAft>
+              <a:buNone/>
+            </a:pPr>
+            <a:endParaRPr sz="1800" b="0" i="0" u="none" strike="noStrike" cap="none">
+              <a:solidFill>
+                <a:schemeClr val="lt1"/>
+              </a:solidFill>
+              <a:latin typeface="Century Gothic"/>
+              <a:ea typeface="Century Gothic"/>
+              <a:cs typeface="Century Gothic"/>
+              <a:sym typeface="Century Gothic"/>
+            </a:endParaRPr>
+          </a:p>
+        </p:txBody>
+      </p:sp>
+      <p:pic>
+        <p:nvPicPr>
+          <p:cNvPr id="216" name="Google Shape;216;p8"/>
+          <p:cNvPicPr preferRelativeResize="0"/>
+          <p:nvPr/>
+        </p:nvPicPr>
+        <p:blipFill rotWithShape="1">
+          <a:blip r:embed="rId3">
+            <a:alphaModFix/>
+          </a:blip>
+          <a:srcRect t="15491" r="3395" b="12709"/>
+          <a:stretch/>
+        </p:blipFill>
+        <p:spPr>
+          <a:xfrm>
+            <a:off x="2997200" y="2878666"/>
+            <a:ext cx="7078133" cy="3507135"/>
+          </a:xfrm>
+          <a:prstGeom prst="rect">
+            <a:avLst/>
+          </a:prstGeom>
+          <a:noFill/>
+          <a:ln>
+            <a:noFill/>
+          </a:ln>
+        </p:spPr>
+      </p:pic>
+    </p:spTree>
+  </p:cSld>
+  <p:clrMapOvr>
+    <a:masterClrMapping/>
+  </p:clrMapOvr>
+</p:sld>
+</file>
+
+<file path=ppt/slides/slide12.xml><?xml version="1.0" encoding="utf-8"?>
+<p:sld xmlns:a="http://schemas.openxmlformats.org/drawingml/2006/main" xmlns:r="http://schemas.openxmlformats.org/officeDocument/2006/relationships" xmlns:p="http://schemas.openxmlformats.org/presentationml/2006/main">
+  <p:cSld>
+    <p:spTree>
+      <p:nvGrpSpPr>
         <p:cNvPr id="1" name="Shape 220"/>
         <p:cNvGrpSpPr/>
         <p:nvPr/>
@@ -20407,7 +20770,7 @@
 </p:sld>
 </file>
 
-<file path=ppt/slides/slide11.xml><?xml version="1.0" encoding="utf-8"?>
+<file path=ppt/slides/slide13.xml><?xml version="1.0" encoding="utf-8"?>
 <p:sld xmlns:a="http://schemas.openxmlformats.org/drawingml/2006/main" xmlns:r="http://schemas.openxmlformats.org/officeDocument/2006/relationships" xmlns:p="http://schemas.openxmlformats.org/presentationml/2006/main">
   <p:cSld>
     <p:spTree>
@@ -20466,7 +20829,7 @@
 </p:sld>
 </file>
 
-<file path=ppt/slides/slide12.xml><?xml version="1.0" encoding="utf-8"?>
+<file path=ppt/slides/slide14.xml><?xml version="1.0" encoding="utf-8"?>
 <p:sld xmlns:a="http://schemas.openxmlformats.org/drawingml/2006/main" xmlns:r="http://schemas.openxmlformats.org/officeDocument/2006/relationships" xmlns:p="http://schemas.openxmlformats.org/presentationml/2006/main">
   <p:cSld>
     <p:spTree>
@@ -20549,7 +20912,7 @@
 </p:sld>
 </file>
 
-<file path=ppt/slides/slide13.xml><?xml version="1.0" encoding="utf-8"?>
+<file path=ppt/slides/slide15.xml><?xml version="1.0" encoding="utf-8"?>
 <p:sld xmlns:a="http://schemas.openxmlformats.org/drawingml/2006/main" xmlns:r="http://schemas.openxmlformats.org/officeDocument/2006/relationships" xmlns:p="http://schemas.openxmlformats.org/presentationml/2006/main">
   <p:cSld>
     <p:spTree>
@@ -20636,7 +20999,7 @@
 </p:sld>
 </file>
 
-<file path=ppt/slides/slide14.xml><?xml version="1.0" encoding="utf-8"?>
+<file path=ppt/slides/slide16.xml><?xml version="1.0" encoding="utf-8"?>
 <p:sld xmlns:a="http://schemas.openxmlformats.org/drawingml/2006/main" xmlns:r="http://schemas.openxmlformats.org/officeDocument/2006/relationships" xmlns:p="http://schemas.openxmlformats.org/presentationml/2006/main">
   <p:cSld>
     <p:spTree>
@@ -20753,7 +21116,7 @@
 </p:sld>
 </file>
 
-<file path=ppt/slides/slide15.xml><?xml version="1.0" encoding="utf-8"?>
+<file path=ppt/slides/slide17.xml><?xml version="1.0" encoding="utf-8"?>
 <p:sld xmlns:a="http://schemas.openxmlformats.org/drawingml/2006/main" xmlns:r="http://schemas.openxmlformats.org/officeDocument/2006/relationships" xmlns:p="http://schemas.openxmlformats.org/presentationml/2006/main">
   <p:cSld>
     <p:spTree>
@@ -20900,7 +21263,7 @@
 </p:sld>
 </file>
 
-<file path=ppt/slides/slide16.xml><?xml version="1.0" encoding="utf-8"?>
+<file path=ppt/slides/slide18.xml><?xml version="1.0" encoding="utf-8"?>
 <p:sld xmlns:a="http://schemas.openxmlformats.org/drawingml/2006/main" xmlns:r="http://schemas.openxmlformats.org/officeDocument/2006/relationships" xmlns:p="http://schemas.openxmlformats.org/presentationml/2006/main">
   <p:cSld>
     <p:spTree>
@@ -21043,7 +21406,7 @@
 </p:sld>
 </file>
 
-<file path=ppt/slides/slide17.xml><?xml version="1.0" encoding="utf-8"?>
+<file path=ppt/slides/slide19.xml><?xml version="1.0" encoding="utf-8"?>
 <p:sld xmlns:a="http://schemas.openxmlformats.org/drawingml/2006/main" xmlns:r="http://schemas.openxmlformats.org/officeDocument/2006/relationships" xmlns:p="http://schemas.openxmlformats.org/presentationml/2006/main">
   <p:cSld>
     <p:spTree>
@@ -21215,7 +21578,181 @@
 </p:sld>
 </file>
 
-<file path=ppt/slides/slide18.xml><?xml version="1.0" encoding="utf-8"?>
+<file path=ppt/slides/slide2.xml><?xml version="1.0" encoding="utf-8"?>
+<p:sld xmlns:a="http://schemas.openxmlformats.org/drawingml/2006/main" xmlns:r="http://schemas.openxmlformats.org/officeDocument/2006/relationships" xmlns:p="http://schemas.openxmlformats.org/presentationml/2006/main">
+  <p:cSld>
+    <p:spTree>
+      <p:nvGrpSpPr>
+        <p:cNvPr id="1" name="Shape 173"/>
+        <p:cNvGrpSpPr/>
+        <p:nvPr/>
+      </p:nvGrpSpPr>
+      <p:grpSpPr>
+        <a:xfrm>
+          <a:off x="0" y="0"/>
+          <a:ext cx="0" cy="0"/>
+          <a:chOff x="0" y="0"/>
+          <a:chExt cx="0" cy="0"/>
+        </a:xfrm>
+      </p:grpSpPr>
+      <p:sp>
+        <p:nvSpPr>
+          <p:cNvPr id="174" name="Google Shape;174;p2"/>
+          <p:cNvSpPr txBox="1">
+            <a:spLocks noGrp="1"/>
+          </p:cNvSpPr>
+          <p:nvPr>
+            <p:ph type="title"/>
+          </p:nvPr>
+        </p:nvSpPr>
+        <p:spPr>
+          <a:xfrm>
+            <a:off x="2592925" y="624110"/>
+            <a:ext cx="8911687" cy="1280890"/>
+          </a:xfrm>
+          <a:prstGeom prst="rect">
+            <a:avLst/>
+          </a:prstGeom>
+          <a:noFill/>
+          <a:ln>
+            <a:noFill/>
+          </a:ln>
+        </p:spPr>
+        <p:txBody>
+          <a:bodyPr spcFirstLastPara="1" wrap="square" lIns="91425" tIns="45700" rIns="91425" bIns="45700" anchor="t" anchorCtr="0">
+            <a:normAutofit/>
+          </a:bodyPr>
+          <a:lstStyle/>
+          <a:p>
+            <a:pPr marL="0" lvl="0" indent="0" algn="l" rtl="0">
+              <a:spcBef>
+                <a:spcPts val="0"/>
+              </a:spcBef>
+              <a:spcAft>
+                <a:spcPts val="0"/>
+              </a:spcAft>
+              <a:buClr>
+                <a:srgbClr val="262626"/>
+              </a:buClr>
+              <a:buSzPts val="3600"/>
+              <a:buFont typeface="Century Gothic"/>
+              <a:buNone/>
+            </a:pPr>
+            <a:r>
+              <a:rPr lang="en-US"/>
+              <a:t>Today we’re going to:</a:t>
+            </a:r>
+            <a:endParaRPr/>
+          </a:p>
+        </p:txBody>
+      </p:sp>
+      <p:sp>
+        <p:nvSpPr>
+          <p:cNvPr id="175" name="Google Shape;175;p2"/>
+          <p:cNvSpPr txBox="1">
+            <a:spLocks noGrp="1"/>
+          </p:cNvSpPr>
+          <p:nvPr>
+            <p:ph type="body" idx="1"/>
+          </p:nvPr>
+        </p:nvSpPr>
+        <p:spPr>
+          <a:xfrm>
+            <a:off x="2589212" y="2133600"/>
+            <a:ext cx="8915400" cy="3777622"/>
+          </a:xfrm>
+          <a:prstGeom prst="rect">
+            <a:avLst/>
+          </a:prstGeom>
+          <a:noFill/>
+          <a:ln>
+            <a:noFill/>
+          </a:ln>
+        </p:spPr>
+        <p:txBody>
+          <a:bodyPr spcFirstLastPara="1" wrap="square" lIns="91425" tIns="45700" rIns="91425" bIns="45700" anchor="t" anchorCtr="0">
+            <a:normAutofit/>
+          </a:bodyPr>
+          <a:lstStyle/>
+          <a:p>
+            <a:pPr marL="342900" lvl="0" indent="-342900" algn="l" rtl="0">
+              <a:spcBef>
+                <a:spcPts val="0"/>
+              </a:spcBef>
+              <a:spcAft>
+                <a:spcPts val="0"/>
+              </a:spcAft>
+              <a:buSzPts val="1800"/>
+              <a:buChar char="🠶"/>
+            </a:pPr>
+            <a:r>
+              <a:rPr lang="en-US"/>
+              <a:t>Go over learning objectives of the class</a:t>
+            </a:r>
+            <a:endParaRPr/>
+          </a:p>
+          <a:p>
+            <a:pPr marL="342900" lvl="0" indent="-342900" algn="l" rtl="0">
+              <a:spcBef>
+                <a:spcPts val="1000"/>
+              </a:spcBef>
+              <a:spcAft>
+                <a:spcPts val="0"/>
+              </a:spcAft>
+              <a:buSzPts val="1800"/>
+              <a:buChar char="🠶"/>
+            </a:pPr>
+            <a:r>
+              <a:rPr lang="en-US"/>
+              <a:t>Talk about the basic philosophy of (frequentist) statistics</a:t>
+            </a:r>
+            <a:endParaRPr/>
+          </a:p>
+          <a:p>
+            <a:pPr marL="342900" lvl="0" indent="-342900" algn="l" rtl="0">
+              <a:spcBef>
+                <a:spcPts val="1000"/>
+              </a:spcBef>
+              <a:spcAft>
+                <a:spcPts val="0"/>
+              </a:spcAft>
+              <a:buSzPts val="1800"/>
+              <a:buChar char="🠶"/>
+            </a:pPr>
+            <a:r>
+              <a:rPr lang="en-US"/>
+              <a:t>Talk about the use of simulations, and the summative assessment</a:t>
+            </a:r>
+            <a:endParaRPr/>
+          </a:p>
+          <a:p>
+            <a:pPr marL="342900" lvl="0" indent="-342900" algn="l" rtl="0">
+              <a:spcBef>
+                <a:spcPts val="1000"/>
+              </a:spcBef>
+              <a:spcAft>
+                <a:spcPts val="0"/>
+              </a:spcAft>
+              <a:buSzPts val="1800"/>
+              <a:buChar char="🠶"/>
+            </a:pPr>
+            <a:r>
+              <a:rPr lang="en-US"/>
+              <a:t>Interpret some methods sections of scientific papers in groups</a:t>
+            </a:r>
+            <a:endParaRPr/>
+          </a:p>
+        </p:txBody>
+      </p:sp>
+    </p:spTree>
+  </p:cSld>
+  <p:clrMapOvr>
+    <a:masterClrMapping/>
+  </p:clrMapOvr>
+</p:sld>
+</file>
+
+<file path=ppt/slides/slide20.xml><?xml version="1.0" encoding="utf-8"?>
 <p:sld xmlns:a="http://schemas.openxmlformats.org/drawingml/2006/main" xmlns:r="http://schemas.openxmlformats.org/officeDocument/2006/relationships" xmlns:p="http://schemas.openxmlformats.org/presentationml/2006/main">
   <p:cSld>
     <p:spTree>
@@ -21298,7 +21835,7 @@
 </p:sld>
 </file>
 
-<file path=ppt/slides/slide19.xml><?xml version="1.0" encoding="utf-8"?>
+<file path=ppt/slides/slide21.xml><?xml version="1.0" encoding="utf-8"?>
 <p:sld xmlns:a="http://schemas.openxmlformats.org/drawingml/2006/main" xmlns:r="http://schemas.openxmlformats.org/officeDocument/2006/relationships" xmlns:p="http://schemas.openxmlformats.org/presentationml/2006/main">
   <p:cSld>
     <p:spTree>
@@ -21386,181 +21923,7 @@
 </p:sld>
 </file>
 
-<file path=ppt/slides/slide2.xml><?xml version="1.0" encoding="utf-8"?>
-<p:sld xmlns:a="http://schemas.openxmlformats.org/drawingml/2006/main" xmlns:r="http://schemas.openxmlformats.org/officeDocument/2006/relationships" xmlns:p="http://schemas.openxmlformats.org/presentationml/2006/main">
-  <p:cSld>
-    <p:spTree>
-      <p:nvGrpSpPr>
-        <p:cNvPr id="1" name="Shape 173"/>
-        <p:cNvGrpSpPr/>
-        <p:nvPr/>
-      </p:nvGrpSpPr>
-      <p:grpSpPr>
-        <a:xfrm>
-          <a:off x="0" y="0"/>
-          <a:ext cx="0" cy="0"/>
-          <a:chOff x="0" y="0"/>
-          <a:chExt cx="0" cy="0"/>
-        </a:xfrm>
-      </p:grpSpPr>
-      <p:sp>
-        <p:nvSpPr>
-          <p:cNvPr id="174" name="Google Shape;174;p2"/>
-          <p:cNvSpPr txBox="1">
-            <a:spLocks noGrp="1"/>
-          </p:cNvSpPr>
-          <p:nvPr>
-            <p:ph type="title"/>
-          </p:nvPr>
-        </p:nvSpPr>
-        <p:spPr>
-          <a:xfrm>
-            <a:off x="2592925" y="624110"/>
-            <a:ext cx="8911687" cy="1280890"/>
-          </a:xfrm>
-          <a:prstGeom prst="rect">
-            <a:avLst/>
-          </a:prstGeom>
-          <a:noFill/>
-          <a:ln>
-            <a:noFill/>
-          </a:ln>
-        </p:spPr>
-        <p:txBody>
-          <a:bodyPr spcFirstLastPara="1" wrap="square" lIns="91425" tIns="45700" rIns="91425" bIns="45700" anchor="t" anchorCtr="0">
-            <a:normAutofit/>
-          </a:bodyPr>
-          <a:lstStyle/>
-          <a:p>
-            <a:pPr marL="0" lvl="0" indent="0" algn="l" rtl="0">
-              <a:spcBef>
-                <a:spcPts val="0"/>
-              </a:spcBef>
-              <a:spcAft>
-                <a:spcPts val="0"/>
-              </a:spcAft>
-              <a:buClr>
-                <a:srgbClr val="262626"/>
-              </a:buClr>
-              <a:buSzPts val="3600"/>
-              <a:buFont typeface="Century Gothic"/>
-              <a:buNone/>
-            </a:pPr>
-            <a:r>
-              <a:rPr lang="en-US"/>
-              <a:t>Today we’re going to:</a:t>
-            </a:r>
-            <a:endParaRPr/>
-          </a:p>
-        </p:txBody>
-      </p:sp>
-      <p:sp>
-        <p:nvSpPr>
-          <p:cNvPr id="175" name="Google Shape;175;p2"/>
-          <p:cNvSpPr txBox="1">
-            <a:spLocks noGrp="1"/>
-          </p:cNvSpPr>
-          <p:nvPr>
-            <p:ph type="body" idx="1"/>
-          </p:nvPr>
-        </p:nvSpPr>
-        <p:spPr>
-          <a:xfrm>
-            <a:off x="2589212" y="2133600"/>
-            <a:ext cx="8915400" cy="3777622"/>
-          </a:xfrm>
-          <a:prstGeom prst="rect">
-            <a:avLst/>
-          </a:prstGeom>
-          <a:noFill/>
-          <a:ln>
-            <a:noFill/>
-          </a:ln>
-        </p:spPr>
-        <p:txBody>
-          <a:bodyPr spcFirstLastPara="1" wrap="square" lIns="91425" tIns="45700" rIns="91425" bIns="45700" anchor="t" anchorCtr="0">
-            <a:normAutofit/>
-          </a:bodyPr>
-          <a:lstStyle/>
-          <a:p>
-            <a:pPr marL="342900" lvl="0" indent="-342900" algn="l" rtl="0">
-              <a:spcBef>
-                <a:spcPts val="0"/>
-              </a:spcBef>
-              <a:spcAft>
-                <a:spcPts val="0"/>
-              </a:spcAft>
-              <a:buSzPts val="1800"/>
-              <a:buChar char="🠶"/>
-            </a:pPr>
-            <a:r>
-              <a:rPr lang="en-US"/>
-              <a:t>Go over learning objectives of the class</a:t>
-            </a:r>
-            <a:endParaRPr/>
-          </a:p>
-          <a:p>
-            <a:pPr marL="342900" lvl="0" indent="-342900" algn="l" rtl="0">
-              <a:spcBef>
-                <a:spcPts val="1000"/>
-              </a:spcBef>
-              <a:spcAft>
-                <a:spcPts val="0"/>
-              </a:spcAft>
-              <a:buSzPts val="1800"/>
-              <a:buChar char="🠶"/>
-            </a:pPr>
-            <a:r>
-              <a:rPr lang="en-US"/>
-              <a:t>Talk about the basic philosophy of (frequentist) statistics</a:t>
-            </a:r>
-            <a:endParaRPr/>
-          </a:p>
-          <a:p>
-            <a:pPr marL="342900" lvl="0" indent="-342900" algn="l" rtl="0">
-              <a:spcBef>
-                <a:spcPts val="1000"/>
-              </a:spcBef>
-              <a:spcAft>
-                <a:spcPts val="0"/>
-              </a:spcAft>
-              <a:buSzPts val="1800"/>
-              <a:buChar char="🠶"/>
-            </a:pPr>
-            <a:r>
-              <a:rPr lang="en-US"/>
-              <a:t>Talk about the use of simulations, and the summative assessment</a:t>
-            </a:r>
-            <a:endParaRPr/>
-          </a:p>
-          <a:p>
-            <a:pPr marL="342900" lvl="0" indent="-342900" algn="l" rtl="0">
-              <a:spcBef>
-                <a:spcPts val="1000"/>
-              </a:spcBef>
-              <a:spcAft>
-                <a:spcPts val="0"/>
-              </a:spcAft>
-              <a:buSzPts val="1800"/>
-              <a:buChar char="🠶"/>
-            </a:pPr>
-            <a:r>
-              <a:rPr lang="en-US"/>
-              <a:t>Interpret some methods sections of scientific papers in groups</a:t>
-            </a:r>
-            <a:endParaRPr/>
-          </a:p>
-        </p:txBody>
-      </p:sp>
-    </p:spTree>
-  </p:cSld>
-  <p:clrMapOvr>
-    <a:masterClrMapping/>
-  </p:clrMapOvr>
-</p:sld>
-</file>
-
-<file path=ppt/slides/slide20.xml><?xml version="1.0" encoding="utf-8"?>
+<file path=ppt/slides/slide22.xml><?xml version="1.0" encoding="utf-8"?>
 <p:sld xmlns:a="http://schemas.openxmlformats.org/drawingml/2006/main" xmlns:r="http://schemas.openxmlformats.org/officeDocument/2006/relationships" xmlns:p="http://schemas.openxmlformats.org/presentationml/2006/main">
   <p:cSld>
     <p:spTree>
@@ -21654,7 +22017,7 @@
 </p:sld>
 </file>
 
-<file path=ppt/slides/slide21.xml><?xml version="1.0" encoding="utf-8"?>
+<file path=ppt/slides/slide23.xml><?xml version="1.0" encoding="utf-8"?>
 <p:sld xmlns:a="http://schemas.openxmlformats.org/drawingml/2006/main" xmlns:r="http://schemas.openxmlformats.org/officeDocument/2006/relationships" xmlns:p="http://schemas.openxmlformats.org/presentationml/2006/main">
   <p:cSld>
     <p:spTree>
@@ -21754,7 +22117,7 @@
 </p:sld>
 </file>
 
-<file path=ppt/slides/slide22.xml><?xml version="1.0" encoding="utf-8"?>
+<file path=ppt/slides/slide24.xml><?xml version="1.0" encoding="utf-8"?>
 <p:sld xmlns:a="http://schemas.openxmlformats.org/drawingml/2006/main" xmlns:r="http://schemas.openxmlformats.org/officeDocument/2006/relationships" xmlns:p="http://schemas.openxmlformats.org/presentationml/2006/main">
   <p:cSld>
     <p:spTree>
@@ -21866,7 +22229,7 @@
 </p:sld>
 </file>
 
-<file path=ppt/slides/slide23.xml><?xml version="1.0" encoding="utf-8"?>
+<file path=ppt/slides/slide25.xml><?xml version="1.0" encoding="utf-8"?>
 <p:sld xmlns:a="http://schemas.openxmlformats.org/drawingml/2006/main" xmlns:r="http://schemas.openxmlformats.org/officeDocument/2006/relationships" xmlns:p="http://schemas.openxmlformats.org/presentationml/2006/main">
   <p:cSld>
     <p:spTree>
@@ -21984,7 +22347,7 @@
 </p:sld>
 </file>
 
-<file path=ppt/slides/slide24.xml><?xml version="1.0" encoding="utf-8"?>
+<file path=ppt/slides/slide26.xml><?xml version="1.0" encoding="utf-8"?>
 <p:sld xmlns:a="http://schemas.openxmlformats.org/drawingml/2006/main" xmlns:r="http://schemas.openxmlformats.org/officeDocument/2006/relationships" xmlns:p="http://schemas.openxmlformats.org/presentationml/2006/main">
   <p:cSld>
     <p:spTree>
@@ -22102,7 +22465,7 @@
 </p:sld>
 </file>
 
-<file path=ppt/slides/slide25.xml><?xml version="1.0" encoding="utf-8"?>
+<file path=ppt/slides/slide27.xml><?xml version="1.0" encoding="utf-8"?>
 <p:sld xmlns:a="http://schemas.openxmlformats.org/drawingml/2006/main" xmlns:r="http://schemas.openxmlformats.org/officeDocument/2006/relationships" xmlns:p="http://schemas.openxmlformats.org/presentationml/2006/main">
   <p:cSld>
     <p:spTree>
@@ -22189,7 +22552,7 @@
 </p:sld>
 </file>
 
-<file path=ppt/slides/slide26.xml><?xml version="1.0" encoding="utf-8"?>
+<file path=ppt/slides/slide28.xml><?xml version="1.0" encoding="utf-8"?>
 <p:sld xmlns:a="http://schemas.openxmlformats.org/drawingml/2006/main" xmlns:r="http://schemas.openxmlformats.org/officeDocument/2006/relationships" xmlns:p="http://schemas.openxmlformats.org/presentationml/2006/main">
   <p:cSld>
     <p:spTree>
@@ -22252,7 +22615,9 @@
         </p:nvSpPr>
         <p:spPr/>
         <p:txBody>
-          <a:bodyPr/>
+          <a:bodyPr>
+            <a:normAutofit lnSpcReduction="10000"/>
+          </a:bodyPr>
           <a:lstStyle/>
           <a:p>
             <a:r>
@@ -22293,6 +22658,25 @@
               <a:rPr lang="en-US" dirty="0"/>
               <a:t>This will be an assignment (on a paper of your choosing) due week 7.</a:t>
             </a:r>
+          </a:p>
+          <a:p>
+            <a:r>
+              <a:rPr lang="en-US" dirty="0"/>
+              <a:t>There is a link to hand in what you’ve done on </a:t>
+            </a:r>
+            <a:r>
+              <a:rPr lang="en-US" dirty="0" err="1"/>
+              <a:t>eClass</a:t>
+            </a:r>
+            <a:r>
+              <a:rPr lang="en-US" dirty="0"/>
+              <a:t> – it goes to </a:t>
+            </a:r>
+            <a:r>
+              <a:rPr lang="en-US" dirty="0" err="1"/>
+              <a:t>crowdmark</a:t>
+            </a:r>
+            <a:endParaRPr lang="en-US" dirty="0"/>
           </a:p>
         </p:txBody>
       </p:sp>
@@ -22422,7 +22806,7 @@
 </p:sld>
 </file>
 
-<file path=ppt/slides/slide27.xml><?xml version="1.0" encoding="utf-8"?>
+<file path=ppt/slides/slide29.xml><?xml version="1.0" encoding="utf-8"?>
 <p:sld xmlns:a="http://schemas.openxmlformats.org/drawingml/2006/main" xmlns:r="http://schemas.openxmlformats.org/officeDocument/2006/relationships" xmlns:p="http://schemas.openxmlformats.org/presentationml/2006/main">
   <p:cSld>
     <p:spTree>
@@ -23418,6 +23802,566 @@
           <p:cNvPr id="2" name="Title 1">
             <a:extLst>
               <a:ext uri="{FF2B5EF4-FFF2-40B4-BE49-F238E27FC236}">
+                <a16:creationId xmlns:a16="http://schemas.microsoft.com/office/drawing/2014/main" id="{C268B5DC-E165-2E99-1F87-198B29380B0C}"/>
+              </a:ext>
+            </a:extLst>
+          </p:cNvPr>
+          <p:cNvSpPr>
+            <a:spLocks noGrp="1"/>
+          </p:cNvSpPr>
+          <p:nvPr>
+            <p:ph type="title"/>
+          </p:nvPr>
+        </p:nvSpPr>
+        <p:spPr/>
+        <p:txBody>
+          <a:bodyPr/>
+          <a:lstStyle/>
+          <a:p>
+            <a:r>
+              <a:rPr lang="en-US" dirty="0"/>
+              <a:t>Assignments for this class:</a:t>
+            </a:r>
+          </a:p>
+        </p:txBody>
+      </p:sp>
+      <p:sp>
+        <p:nvSpPr>
+          <p:cNvPr id="3" name="Text Placeholder 2">
+            <a:extLst>
+              <a:ext uri="{FF2B5EF4-FFF2-40B4-BE49-F238E27FC236}">
+                <a16:creationId xmlns:a16="http://schemas.microsoft.com/office/drawing/2014/main" id="{4A1AF712-7180-91B4-97EC-3F6F683ABD72}"/>
+              </a:ext>
+            </a:extLst>
+          </p:cNvPr>
+          <p:cNvSpPr>
+            <a:spLocks noGrp="1"/>
+          </p:cNvSpPr>
+          <p:nvPr>
+            <p:ph type="body" idx="1"/>
+          </p:nvPr>
+        </p:nvSpPr>
+        <p:spPr/>
+        <p:txBody>
+          <a:bodyPr>
+            <a:normAutofit/>
+          </a:bodyPr>
+          <a:lstStyle/>
+          <a:p>
+            <a:pPr marL="114300" indent="0" algn="l">
+              <a:buNone/>
+            </a:pPr>
+            <a:r>
+              <a:rPr lang="en-CA" b="1" i="0" dirty="0">
+                <a:solidFill>
+                  <a:srgbClr val="495057"/>
+                </a:solidFill>
+                <a:effectLst/>
+                <a:latin typeface="-apple-system"/>
+              </a:rPr>
+              <a:t>- 10% attendance and attempts</a:t>
+            </a:r>
+            <a:r>
+              <a:rPr lang="en-CA" b="0" i="0" dirty="0">
+                <a:solidFill>
+                  <a:srgbClr val="495057"/>
+                </a:solidFill>
+                <a:effectLst/>
+                <a:latin typeface="-apple-system"/>
+              </a:rPr>
+              <a:t>, where code (or something) is written in 5/6 of the first lectures. Just need to hand 5 things in to get full marks. They don't need to work, you just need to show good faith effort!</a:t>
+            </a:r>
+          </a:p>
+          <a:p>
+            <a:pPr marL="114300" indent="0" algn="l">
+              <a:buNone/>
+            </a:pPr>
+            <a:r>
+              <a:rPr lang="en-CA" b="1" i="0" dirty="0">
+                <a:solidFill>
+                  <a:srgbClr val="495057"/>
+                </a:solidFill>
+                <a:effectLst/>
+                <a:latin typeface="-apple-system"/>
+              </a:rPr>
+              <a:t>- 30% summarize a published paper</a:t>
+            </a:r>
+            <a:r>
+              <a:rPr lang="en-CA" b="0" i="0" dirty="0">
+                <a:solidFill>
+                  <a:srgbClr val="495057"/>
+                </a:solidFill>
+                <a:effectLst/>
+                <a:latin typeface="-apple-system"/>
+              </a:rPr>
+              <a:t>, simulate data (and justify the simulations) to match the data as have been describe, write analyses in R to analyze the data as has been described (possibly done in a group?) - due at end of week 7, where week 7 is a work period</a:t>
+            </a:r>
+          </a:p>
+          <a:p>
+            <a:pPr marL="114300" indent="0" algn="l">
+              <a:buNone/>
+            </a:pPr>
+            <a:r>
+              <a:rPr lang="en-CA" b="1" i="0" dirty="0">
+                <a:solidFill>
+                  <a:srgbClr val="495057"/>
+                </a:solidFill>
+                <a:effectLst/>
+                <a:latin typeface="-apple-system"/>
+              </a:rPr>
+              <a:t>- 60% registered report </a:t>
+            </a:r>
+            <a:r>
+              <a:rPr lang="en-CA" b="0" i="0" dirty="0">
+                <a:solidFill>
+                  <a:srgbClr val="495057"/>
+                </a:solidFill>
+                <a:effectLst/>
+                <a:latin typeface="-apple-system"/>
+              </a:rPr>
+              <a:t>with a short (2pg) introduction, methods, and specific statistical methods to match a project in the student's thesis. Possibly following [Nature Ecology Evolution](https://</a:t>
+            </a:r>
+            <a:r>
+              <a:rPr lang="en-CA" b="0" i="0" dirty="0" err="1">
+                <a:solidFill>
+                  <a:srgbClr val="495057"/>
+                </a:solidFill>
+                <a:effectLst/>
+                <a:latin typeface="-apple-system"/>
+              </a:rPr>
+              <a:t>www.nature.com</a:t>
+            </a:r>
+            <a:r>
+              <a:rPr lang="en-CA" b="0" i="0" dirty="0">
+                <a:solidFill>
+                  <a:srgbClr val="495057"/>
+                </a:solidFill>
+                <a:effectLst/>
+                <a:latin typeface="-apple-system"/>
+              </a:rPr>
+              <a:t>/</a:t>
+            </a:r>
+            <a:r>
+              <a:rPr lang="en-CA" b="0" i="0" dirty="0" err="1">
+                <a:solidFill>
+                  <a:srgbClr val="495057"/>
+                </a:solidFill>
+                <a:effectLst/>
+                <a:latin typeface="-apple-system"/>
+              </a:rPr>
+              <a:t>natecolevol</a:t>
+            </a:r>
+            <a:r>
+              <a:rPr lang="en-CA" b="0" i="0" dirty="0">
+                <a:solidFill>
+                  <a:srgbClr val="495057"/>
+                </a:solidFill>
+                <a:effectLst/>
+                <a:latin typeface="-apple-system"/>
+              </a:rPr>
+              <a:t>/submission-guidelines/</a:t>
+            </a:r>
+            <a:r>
+              <a:rPr lang="en-CA" b="0" i="0" dirty="0" err="1">
+                <a:solidFill>
+                  <a:srgbClr val="495057"/>
+                </a:solidFill>
+                <a:effectLst/>
+                <a:latin typeface="-apple-system"/>
+              </a:rPr>
+              <a:t>registeredreports</a:t>
+            </a:r>
+            <a:r>
+              <a:rPr lang="en-CA" b="0" i="0" dirty="0">
+                <a:solidFill>
+                  <a:srgbClr val="495057"/>
+                </a:solidFill>
+                <a:effectLst/>
+                <a:latin typeface="-apple-system"/>
+              </a:rPr>
+              <a:t>), or [Ecology and Evolution](https://</a:t>
+            </a:r>
+            <a:r>
+              <a:rPr lang="en-CA" b="0" i="0" dirty="0" err="1">
+                <a:solidFill>
+                  <a:srgbClr val="495057"/>
+                </a:solidFill>
+                <a:effectLst/>
+                <a:latin typeface="-apple-system"/>
+              </a:rPr>
+              <a:t>onlinelibrary.wiley.com</a:t>
+            </a:r>
+            <a:r>
+              <a:rPr lang="en-CA" b="0" i="0" dirty="0">
+                <a:solidFill>
+                  <a:srgbClr val="495057"/>
+                </a:solidFill>
+                <a:effectLst/>
+                <a:latin typeface="-apple-system"/>
+              </a:rPr>
+              <a:t>/page/journal/20457758/homepage/</a:t>
+            </a:r>
+            <a:r>
+              <a:rPr lang="en-CA" b="0" i="0" dirty="0" err="1">
+                <a:solidFill>
+                  <a:srgbClr val="495057"/>
+                </a:solidFill>
+                <a:effectLst/>
+                <a:latin typeface="-apple-system"/>
+              </a:rPr>
+              <a:t>registeredreports.html</a:t>
+            </a:r>
+            <a:r>
+              <a:rPr lang="en-CA" b="0" i="0" dirty="0">
+                <a:solidFill>
+                  <a:srgbClr val="495057"/>
+                </a:solidFill>
+                <a:effectLst/>
+                <a:latin typeface="-apple-system"/>
+              </a:rPr>
+              <a:t>) guidelines. </a:t>
+            </a:r>
+          </a:p>
+          <a:p>
+            <a:endParaRPr lang="en-US" dirty="0"/>
+          </a:p>
+        </p:txBody>
+      </p:sp>
+    </p:spTree>
+    <p:extLst>
+      <p:ext uri="{BB962C8B-B14F-4D97-AF65-F5344CB8AC3E}">
+        <p14:creationId xmlns:p14="http://schemas.microsoft.com/office/powerpoint/2010/main" val="3088231142"/>
+      </p:ext>
+    </p:extLst>
+  </p:cSld>
+  <p:clrMapOvr>
+    <a:masterClrMapping/>
+  </p:clrMapOvr>
+</p:sld>
+</file>
+
+<file path=ppt/slides/slide8.xml><?xml version="1.0" encoding="utf-8"?>
+<p:sld xmlns:a="http://schemas.openxmlformats.org/drawingml/2006/main" xmlns:r="http://schemas.openxmlformats.org/officeDocument/2006/relationships" xmlns:p="http://schemas.openxmlformats.org/presentationml/2006/main">
+  <p:cSld>
+    <p:spTree>
+      <p:nvGrpSpPr>
+        <p:cNvPr id="1" name=""/>
+        <p:cNvGrpSpPr/>
+        <p:nvPr/>
+      </p:nvGrpSpPr>
+      <p:grpSpPr>
+        <a:xfrm>
+          <a:off x="0" y="0"/>
+          <a:ext cx="0" cy="0"/>
+          <a:chOff x="0" y="0"/>
+          <a:chExt cx="0" cy="0"/>
+        </a:xfrm>
+      </p:grpSpPr>
+      <p:sp>
+        <p:nvSpPr>
+          <p:cNvPr id="2" name="Title 1">
+            <a:extLst>
+              <a:ext uri="{FF2B5EF4-FFF2-40B4-BE49-F238E27FC236}">
+                <a16:creationId xmlns:a16="http://schemas.microsoft.com/office/drawing/2014/main" id="{53A0C5DC-FE9F-D6C4-9B18-F78FA5B66B51}"/>
+              </a:ext>
+            </a:extLst>
+          </p:cNvPr>
+          <p:cNvSpPr>
+            <a:spLocks noGrp="1"/>
+          </p:cNvSpPr>
+          <p:nvPr>
+            <p:ph type="title"/>
+          </p:nvPr>
+        </p:nvSpPr>
+        <p:spPr/>
+        <p:txBody>
+          <a:bodyPr/>
+          <a:lstStyle/>
+          <a:p>
+            <a:r>
+              <a:rPr lang="en-US" dirty="0"/>
+              <a:t>Registered Report</a:t>
+            </a:r>
+          </a:p>
+        </p:txBody>
+      </p:sp>
+      <p:sp>
+        <p:nvSpPr>
+          <p:cNvPr id="3" name="Text Placeholder 2">
+            <a:extLst>
+              <a:ext uri="{FF2B5EF4-FFF2-40B4-BE49-F238E27FC236}">
+                <a16:creationId xmlns:a16="http://schemas.microsoft.com/office/drawing/2014/main" id="{F6FAD255-8249-C7C3-473F-AABA902AE41C}"/>
+              </a:ext>
+            </a:extLst>
+          </p:cNvPr>
+          <p:cNvSpPr>
+            <a:spLocks noGrp="1"/>
+          </p:cNvSpPr>
+          <p:nvPr>
+            <p:ph type="body" idx="1"/>
+          </p:nvPr>
+        </p:nvSpPr>
+        <p:spPr/>
+        <p:txBody>
+          <a:bodyPr>
+            <a:normAutofit fontScale="85000" lnSpcReduction="10000"/>
+          </a:bodyPr>
+          <a:lstStyle/>
+          <a:p>
+            <a:pPr marL="114300" indent="0" algn="l">
+              <a:buNone/>
+            </a:pPr>
+            <a:r>
+              <a:rPr lang="en-CA" b="1" i="0" dirty="0">
+                <a:solidFill>
+                  <a:srgbClr val="495057"/>
+                </a:solidFill>
+                <a:effectLst/>
+                <a:latin typeface="-apple-system"/>
+              </a:rPr>
+              <a:t>- 60% registered report </a:t>
+            </a:r>
+            <a:r>
+              <a:rPr lang="en-CA" b="0" i="0" dirty="0">
+                <a:solidFill>
+                  <a:srgbClr val="495057"/>
+                </a:solidFill>
+                <a:effectLst/>
+                <a:latin typeface="-apple-system"/>
+              </a:rPr>
+              <a:t>with a short (2pg) introduction, methods, and specific statistical methods to match a project in the student's thesis. Possibly following [Nature Ecology Evolution](https://</a:t>
+            </a:r>
+            <a:r>
+              <a:rPr lang="en-CA" b="0" i="0" dirty="0" err="1">
+                <a:solidFill>
+                  <a:srgbClr val="495057"/>
+                </a:solidFill>
+                <a:effectLst/>
+                <a:latin typeface="-apple-system"/>
+              </a:rPr>
+              <a:t>www.nature.com</a:t>
+            </a:r>
+            <a:r>
+              <a:rPr lang="en-CA" b="0" i="0" dirty="0">
+                <a:solidFill>
+                  <a:srgbClr val="495057"/>
+                </a:solidFill>
+                <a:effectLst/>
+                <a:latin typeface="-apple-system"/>
+              </a:rPr>
+              <a:t>/</a:t>
+            </a:r>
+            <a:r>
+              <a:rPr lang="en-CA" b="0" i="0" dirty="0" err="1">
+                <a:solidFill>
+                  <a:srgbClr val="495057"/>
+                </a:solidFill>
+                <a:effectLst/>
+                <a:latin typeface="-apple-system"/>
+              </a:rPr>
+              <a:t>natecolevol</a:t>
+            </a:r>
+            <a:r>
+              <a:rPr lang="en-CA" b="0" i="0" dirty="0">
+                <a:solidFill>
+                  <a:srgbClr val="495057"/>
+                </a:solidFill>
+                <a:effectLst/>
+                <a:latin typeface="-apple-system"/>
+              </a:rPr>
+              <a:t>/submission-guidelines/</a:t>
+            </a:r>
+            <a:r>
+              <a:rPr lang="en-CA" b="0" i="0" dirty="0" err="1">
+                <a:solidFill>
+                  <a:srgbClr val="495057"/>
+                </a:solidFill>
+                <a:effectLst/>
+                <a:latin typeface="-apple-system"/>
+              </a:rPr>
+              <a:t>registeredreports</a:t>
+            </a:r>
+            <a:r>
+              <a:rPr lang="en-CA" b="0" i="0" dirty="0">
+                <a:solidFill>
+                  <a:srgbClr val="495057"/>
+                </a:solidFill>
+                <a:effectLst/>
+                <a:latin typeface="-apple-system"/>
+              </a:rPr>
+              <a:t>), or [Ecology and Evolution](https://</a:t>
+            </a:r>
+            <a:r>
+              <a:rPr lang="en-CA" b="0" i="0" dirty="0" err="1">
+                <a:solidFill>
+                  <a:srgbClr val="495057"/>
+                </a:solidFill>
+                <a:effectLst/>
+                <a:latin typeface="-apple-system"/>
+              </a:rPr>
+              <a:t>onlinelibrary.wiley.com</a:t>
+            </a:r>
+            <a:r>
+              <a:rPr lang="en-CA" b="0" i="0" dirty="0">
+                <a:solidFill>
+                  <a:srgbClr val="495057"/>
+                </a:solidFill>
+                <a:effectLst/>
+                <a:latin typeface="-apple-system"/>
+              </a:rPr>
+              <a:t>/page/journal/20457758/homepage/</a:t>
+            </a:r>
+            <a:r>
+              <a:rPr lang="en-CA" b="0" i="0" dirty="0" err="1">
+                <a:solidFill>
+                  <a:srgbClr val="495057"/>
+                </a:solidFill>
+                <a:effectLst/>
+                <a:latin typeface="-apple-system"/>
+              </a:rPr>
+              <a:t>registeredreports.html</a:t>
+            </a:r>
+            <a:r>
+              <a:rPr lang="en-CA" b="0" i="0" dirty="0">
+                <a:solidFill>
+                  <a:srgbClr val="495057"/>
+                </a:solidFill>
+                <a:effectLst/>
+                <a:latin typeface="-apple-system"/>
+              </a:rPr>
+              <a:t>) guidelines. </a:t>
+            </a:r>
+          </a:p>
+          <a:p>
+            <a:pPr marL="114300" indent="0" algn="l">
+              <a:buNone/>
+            </a:pPr>
+            <a:r>
+              <a:rPr lang="en-CA" b="0" i="0" dirty="0">
+                <a:solidFill>
+                  <a:srgbClr val="495057"/>
+                </a:solidFill>
+                <a:effectLst/>
+                <a:latin typeface="-apple-system"/>
+              </a:rPr>
+              <a:t> - this will be broken down into:</a:t>
+            </a:r>
+          </a:p>
+          <a:p>
+            <a:pPr marL="114300" indent="0" algn="l">
+              <a:buNone/>
+            </a:pPr>
+            <a:r>
+              <a:rPr lang="en-CA" b="0" i="0" dirty="0">
+                <a:solidFill>
+                  <a:srgbClr val="495057"/>
+                </a:solidFill>
+                <a:effectLst/>
+                <a:latin typeface="-apple-system"/>
+              </a:rPr>
+              <a:t>    1) draft experimental methods for feedback (10%) - week 4</a:t>
+            </a:r>
+          </a:p>
+          <a:p>
+            <a:pPr marL="114300" indent="0" algn="l">
+              <a:buNone/>
+            </a:pPr>
+            <a:r>
+              <a:rPr lang="en-CA" b="0" i="0" dirty="0">
+                <a:solidFill>
+                  <a:srgbClr val="495057"/>
+                </a:solidFill>
+                <a:effectLst/>
+                <a:latin typeface="-apple-system"/>
+              </a:rPr>
+              <a:t>    2) draft of statistical methods with proposed simulations and methods for feedback (10%) - week 8</a:t>
+            </a:r>
+          </a:p>
+          <a:p>
+            <a:pPr marL="114300" indent="0" algn="l">
+              <a:buNone/>
+            </a:pPr>
+            <a:r>
+              <a:rPr lang="en-CA" b="0" i="0" dirty="0">
+                <a:solidFill>
+                  <a:srgbClr val="495057"/>
+                </a:solidFill>
+                <a:effectLst/>
+                <a:latin typeface="-apple-system"/>
+              </a:rPr>
+              <a:t>    3) feedback on someone else's code (5%) - week 9</a:t>
+            </a:r>
+          </a:p>
+          <a:p>
+            <a:pPr marL="114300" indent="0" algn="l">
+              <a:buNone/>
+            </a:pPr>
+            <a:r>
+              <a:rPr lang="en-CA" b="0" i="0" dirty="0">
+                <a:solidFill>
+                  <a:srgbClr val="495057"/>
+                </a:solidFill>
+                <a:effectLst/>
+                <a:latin typeface="-apple-system"/>
+              </a:rPr>
+              <a:t>    4) draft introduction for feedback (10%) - week 10</a:t>
+            </a:r>
+          </a:p>
+          <a:p>
+            <a:pPr marL="114300" indent="0" algn="l">
+              <a:buNone/>
+            </a:pPr>
+            <a:r>
+              <a:rPr lang="en-CA" b="0" i="0" dirty="0">
+                <a:solidFill>
+                  <a:srgbClr val="495057"/>
+                </a:solidFill>
+                <a:effectLst/>
+                <a:latin typeface="-apple-system"/>
+              </a:rPr>
+              <a:t>   5) full registered report, including introduction, methods, statistical methods, simulations and simulated results (25%) - due during exam period</a:t>
+            </a:r>
+          </a:p>
+          <a:p>
+            <a:endParaRPr lang="en-US" dirty="0"/>
+          </a:p>
+        </p:txBody>
+      </p:sp>
+    </p:spTree>
+    <p:extLst>
+      <p:ext uri="{BB962C8B-B14F-4D97-AF65-F5344CB8AC3E}">
+        <p14:creationId xmlns:p14="http://schemas.microsoft.com/office/powerpoint/2010/main" val="3497235493"/>
+      </p:ext>
+    </p:extLst>
+  </p:cSld>
+  <p:clrMapOvr>
+    <a:masterClrMapping/>
+  </p:clrMapOvr>
+</p:sld>
+</file>
+
+<file path=ppt/slides/slide9.xml><?xml version="1.0" encoding="utf-8"?>
+<p:sld xmlns:a="http://schemas.openxmlformats.org/drawingml/2006/main" xmlns:r="http://schemas.openxmlformats.org/officeDocument/2006/relationships" xmlns:p="http://schemas.openxmlformats.org/presentationml/2006/main">
+  <p:cSld>
+    <p:spTree>
+      <p:nvGrpSpPr>
+        <p:cNvPr id="1" name=""/>
+        <p:cNvGrpSpPr/>
+        <p:nvPr/>
+      </p:nvGrpSpPr>
+      <p:grpSpPr>
+        <a:xfrm>
+          <a:off x="0" y="0"/>
+          <a:ext cx="0" cy="0"/>
+          <a:chOff x="0" y="0"/>
+          <a:chExt cx="0" cy="0"/>
+        </a:xfrm>
+      </p:grpSpPr>
+      <p:sp>
+        <p:nvSpPr>
+          <p:cNvPr id="2" name="Title 1">
+            <a:extLst>
+              <a:ext uri="{FF2B5EF4-FFF2-40B4-BE49-F238E27FC236}">
                 <a16:creationId xmlns:a16="http://schemas.microsoft.com/office/drawing/2014/main" id="{8B567414-1CB8-164C-8981-E4D6824B5D31}"/>
               </a:ext>
             </a:extLst>
@@ -23472,374 +24416,6 @@
         <p14:creationId xmlns:p14="http://schemas.microsoft.com/office/powerpoint/2010/main" val="2201580433"/>
       </p:ext>
     </p:extLst>
-  </p:cSld>
-  <p:clrMapOvr>
-    <a:masterClrMapping/>
-  </p:clrMapOvr>
-</p:sld>
-</file>
-
-<file path=ppt/slides/slide8.xml><?xml version="1.0" encoding="utf-8"?>
-<p:sld xmlns:a="http://schemas.openxmlformats.org/drawingml/2006/main" xmlns:r="http://schemas.openxmlformats.org/officeDocument/2006/relationships" xmlns:p="http://schemas.openxmlformats.org/presentationml/2006/main">
-  <p:cSld>
-    <p:spTree>
-      <p:nvGrpSpPr>
-        <p:cNvPr id="1" name="Shape 203"/>
-        <p:cNvGrpSpPr/>
-        <p:nvPr/>
-      </p:nvGrpSpPr>
-      <p:grpSpPr>
-        <a:xfrm>
-          <a:off x="0" y="0"/>
-          <a:ext cx="0" cy="0"/>
-          <a:chOff x="0" y="0"/>
-          <a:chExt cx="0" cy="0"/>
-        </a:xfrm>
-      </p:grpSpPr>
-      <p:sp>
-        <p:nvSpPr>
-          <p:cNvPr id="204" name="Google Shape;204;p7"/>
-          <p:cNvSpPr txBox="1">
-            <a:spLocks noGrp="1"/>
-          </p:cNvSpPr>
-          <p:nvPr>
-            <p:ph type="title"/>
-          </p:nvPr>
-        </p:nvSpPr>
-        <p:spPr>
-          <a:xfrm>
-            <a:off x="2592925" y="624110"/>
-            <a:ext cx="8911687" cy="1280890"/>
-          </a:xfrm>
-          <a:prstGeom prst="rect">
-            <a:avLst/>
-          </a:prstGeom>
-          <a:noFill/>
-          <a:ln>
-            <a:noFill/>
-          </a:ln>
-        </p:spPr>
-        <p:txBody>
-          <a:bodyPr spcFirstLastPara="1" wrap="square" lIns="91425" tIns="45700" rIns="91425" bIns="45700" anchor="t" anchorCtr="0">
-            <a:normAutofit/>
-          </a:bodyPr>
-          <a:lstStyle/>
-          <a:p>
-            <a:pPr marL="0" lvl="0" indent="0" algn="l" rtl="0">
-              <a:spcBef>
-                <a:spcPts val="0"/>
-              </a:spcBef>
-              <a:spcAft>
-                <a:spcPts val="0"/>
-              </a:spcAft>
-              <a:buClr>
-                <a:srgbClr val="262626"/>
-              </a:buClr>
-              <a:buSzPts val="3600"/>
-              <a:buFont typeface="Century Gothic"/>
-              <a:buNone/>
-            </a:pPr>
-            <a:r>
-              <a:rPr lang="en-US"/>
-              <a:t>Linear models</a:t>
-            </a:r>
-            <a:endParaRPr/>
-          </a:p>
-        </p:txBody>
-      </p:sp>
-      <p:sp>
-        <p:nvSpPr>
-          <p:cNvPr id="205" name="Google Shape;205;p7"/>
-          <p:cNvSpPr txBox="1">
-            <a:spLocks noGrp="1"/>
-          </p:cNvSpPr>
-          <p:nvPr>
-            <p:ph type="body" idx="1"/>
-          </p:nvPr>
-        </p:nvSpPr>
-        <p:spPr>
-          <a:xfrm>
-            <a:off x="2589212" y="2133600"/>
-            <a:ext cx="8915400" cy="3777622"/>
-          </a:xfrm>
-          <a:prstGeom prst="rect">
-            <a:avLst/>
-          </a:prstGeom>
-          <a:noFill/>
-          <a:ln>
-            <a:noFill/>
-          </a:ln>
-        </p:spPr>
-        <p:txBody>
-          <a:bodyPr spcFirstLastPara="1" wrap="square" lIns="91425" tIns="45700" rIns="91425" bIns="45700" anchor="t" anchorCtr="0">
-            <a:normAutofit/>
-          </a:bodyPr>
-          <a:lstStyle/>
-          <a:p>
-            <a:pPr marL="342900" lvl="0" indent="-342900" algn="l" rtl="0">
-              <a:spcBef>
-                <a:spcPts val="0"/>
-              </a:spcBef>
-              <a:spcAft>
-                <a:spcPts val="0"/>
-              </a:spcAft>
-              <a:buSzPts val="1800"/>
-              <a:buChar char="🠶"/>
-            </a:pPr>
-            <a:r>
-              <a:rPr lang="en-US"/>
-              <a:t>Most statistical tests are special cases of a linear model</a:t>
-            </a:r>
-            <a:endParaRPr/>
-          </a:p>
-          <a:p>
-            <a:pPr marL="342900" lvl="0" indent="-342900" algn="l" rtl="0">
-              <a:spcBef>
-                <a:spcPts val="1000"/>
-              </a:spcBef>
-              <a:spcAft>
-                <a:spcPts val="0"/>
-              </a:spcAft>
-              <a:buSzPts val="1800"/>
-              <a:buChar char="🠶"/>
-            </a:pPr>
-            <a:r>
-              <a:rPr lang="en-US"/>
-              <a:t>Once you understand a linear model, you can work out the appropriate test</a:t>
-            </a:r>
-            <a:endParaRPr/>
-          </a:p>
-        </p:txBody>
-      </p:sp>
-      <p:pic>
-        <p:nvPicPr>
-          <p:cNvPr id="3" name="Picture 2" descr="A black background with a black square&#10;&#10;Description automatically generated with medium confidence">
-            <a:extLst>
-              <a:ext uri="{FF2B5EF4-FFF2-40B4-BE49-F238E27FC236}">
-                <a16:creationId xmlns:a16="http://schemas.microsoft.com/office/drawing/2014/main" id="{0885251C-0FCA-CC44-BE46-CCFDF279A5E8}"/>
-              </a:ext>
-            </a:extLst>
-          </p:cNvPr>
-          <p:cNvPicPr>
-            <a:picLocks noChangeAspect="1"/>
-          </p:cNvPicPr>
-          <p:nvPr/>
-        </p:nvPicPr>
-        <p:blipFill>
-          <a:blip r:embed="rId3"/>
-          <a:stretch>
-            <a:fillRect/>
-          </a:stretch>
-        </p:blipFill>
-        <p:spPr>
-          <a:xfrm>
-            <a:off x="3843548" y="2808000"/>
-            <a:ext cx="5399999" cy="4050000"/>
-          </a:xfrm>
-          <a:prstGeom prst="rect">
-            <a:avLst/>
-          </a:prstGeom>
-        </p:spPr>
-      </p:pic>
-    </p:spTree>
-  </p:cSld>
-  <p:clrMapOvr>
-    <a:masterClrMapping/>
-  </p:clrMapOvr>
-</p:sld>
-</file>
-
-<file path=ppt/slides/slide9.xml><?xml version="1.0" encoding="utf-8"?>
-<p:sld xmlns:a="http://schemas.openxmlformats.org/drawingml/2006/main" xmlns:r="http://schemas.openxmlformats.org/officeDocument/2006/relationships" xmlns:p="http://schemas.openxmlformats.org/presentationml/2006/main">
-  <p:cSld>
-    <p:spTree>
-      <p:nvGrpSpPr>
-        <p:cNvPr id="1" name="Shape 212"/>
-        <p:cNvGrpSpPr/>
-        <p:nvPr/>
-      </p:nvGrpSpPr>
-      <p:grpSpPr>
-        <a:xfrm>
-          <a:off x="0" y="0"/>
-          <a:ext cx="0" cy="0"/>
-          <a:chOff x="0" y="0"/>
-          <a:chExt cx="0" cy="0"/>
-        </a:xfrm>
-      </p:grpSpPr>
-      <p:sp>
-        <p:nvSpPr>
-          <p:cNvPr id="213" name="Google Shape;213;p8"/>
-          <p:cNvSpPr txBox="1">
-            <a:spLocks noGrp="1"/>
-          </p:cNvSpPr>
-          <p:nvPr>
-            <p:ph type="title"/>
-          </p:nvPr>
-        </p:nvSpPr>
-        <p:spPr>
-          <a:xfrm>
-            <a:off x="2592925" y="624110"/>
-            <a:ext cx="8911687" cy="1280890"/>
-          </a:xfrm>
-          <a:prstGeom prst="rect">
-            <a:avLst/>
-          </a:prstGeom>
-          <a:noFill/>
-          <a:ln>
-            <a:noFill/>
-          </a:ln>
-        </p:spPr>
-        <p:txBody>
-          <a:bodyPr spcFirstLastPara="1" wrap="square" lIns="91425" tIns="45700" rIns="91425" bIns="45700" anchor="t" anchorCtr="0">
-            <a:normAutofit/>
-          </a:bodyPr>
-          <a:lstStyle/>
-          <a:p>
-            <a:pPr marL="0" lvl="0" indent="0" algn="l" rtl="0">
-              <a:spcBef>
-                <a:spcPts val="0"/>
-              </a:spcBef>
-              <a:spcAft>
-                <a:spcPts val="0"/>
-              </a:spcAft>
-              <a:buClr>
-                <a:srgbClr val="262626"/>
-              </a:buClr>
-              <a:buSzPts val="3600"/>
-              <a:buFont typeface="Century Gothic"/>
-              <a:buNone/>
-            </a:pPr>
-            <a:r>
-              <a:rPr lang="en-US"/>
-              <a:t>Linear models</a:t>
-            </a:r>
-            <a:endParaRPr/>
-          </a:p>
-        </p:txBody>
-      </p:sp>
-      <p:sp>
-        <p:nvSpPr>
-          <p:cNvPr id="214" name="Google Shape;214;p8"/>
-          <p:cNvSpPr txBox="1">
-            <a:spLocks noGrp="1"/>
-          </p:cNvSpPr>
-          <p:nvPr>
-            <p:ph type="body" idx="1"/>
-          </p:nvPr>
-        </p:nvSpPr>
-        <p:spPr>
-          <a:xfrm>
-            <a:off x="2589212" y="2133600"/>
-            <a:ext cx="8915400" cy="3777622"/>
-          </a:xfrm>
-          <a:prstGeom prst="rect">
-            <a:avLst/>
-          </a:prstGeom>
-          <a:noFill/>
-          <a:ln>
-            <a:noFill/>
-          </a:ln>
-        </p:spPr>
-        <p:txBody>
-          <a:bodyPr spcFirstLastPara="1" wrap="square" lIns="91425" tIns="45700" rIns="91425" bIns="45700" anchor="t" anchorCtr="0">
-            <a:normAutofit/>
-          </a:bodyPr>
-          <a:lstStyle/>
-          <a:p>
-            <a:pPr marL="342900" lvl="0" indent="-342900" algn="l" rtl="0">
-              <a:spcBef>
-                <a:spcPts val="0"/>
-              </a:spcBef>
-              <a:spcAft>
-                <a:spcPts val="0"/>
-              </a:spcAft>
-              <a:buSzPts val="1800"/>
-              <a:buChar char="🠶"/>
-            </a:pPr>
-            <a:r>
-              <a:rPr lang="en-US"/>
-              <a:t>Another way to think about this is, what do I think the underlying distributions of each data set is here?</a:t>
-            </a:r>
-            <a:endParaRPr/>
-          </a:p>
-        </p:txBody>
-      </p:sp>
-      <p:sp>
-        <p:nvSpPr>
-          <p:cNvPr id="215" name="Google Shape;215;p8"/>
-          <p:cNvSpPr/>
-          <p:nvPr/>
-        </p:nvSpPr>
-        <p:spPr>
-          <a:xfrm>
-            <a:off x="7463481" y="4547286"/>
-            <a:ext cx="766119" cy="259492"/>
-          </a:xfrm>
-          <a:prstGeom prst="rect">
-            <a:avLst/>
-          </a:prstGeom>
-          <a:solidFill>
-            <a:schemeClr val="lt1"/>
-          </a:solidFill>
-          <a:ln>
-            <a:noFill/>
-          </a:ln>
-        </p:spPr>
-        <p:txBody>
-          <a:bodyPr spcFirstLastPara="1" wrap="square" lIns="91425" tIns="45700" rIns="91425" bIns="45700" anchor="ctr" anchorCtr="0">
-            <a:noAutofit/>
-          </a:bodyPr>
-          <a:lstStyle/>
-          <a:p>
-            <a:pPr marL="0" marR="0" lvl="0" indent="0" algn="ctr" rtl="0">
-              <a:spcBef>
-                <a:spcPts val="0"/>
-              </a:spcBef>
-              <a:spcAft>
-                <a:spcPts val="0"/>
-              </a:spcAft>
-              <a:buNone/>
-            </a:pPr>
-            <a:endParaRPr sz="1800" b="0" i="0" u="none" strike="noStrike" cap="none">
-              <a:solidFill>
-                <a:schemeClr val="lt1"/>
-              </a:solidFill>
-              <a:latin typeface="Century Gothic"/>
-              <a:ea typeface="Century Gothic"/>
-              <a:cs typeface="Century Gothic"/>
-              <a:sym typeface="Century Gothic"/>
-            </a:endParaRPr>
-          </a:p>
-        </p:txBody>
-      </p:sp>
-      <p:pic>
-        <p:nvPicPr>
-          <p:cNvPr id="216" name="Google Shape;216;p8"/>
-          <p:cNvPicPr preferRelativeResize="0"/>
-          <p:nvPr/>
-        </p:nvPicPr>
-        <p:blipFill rotWithShape="1">
-          <a:blip r:embed="rId3">
-            <a:alphaModFix/>
-          </a:blip>
-          <a:srcRect t="15491" r="3395" b="12709"/>
-          <a:stretch/>
-        </p:blipFill>
-        <p:spPr>
-          <a:xfrm>
-            <a:off x="2997200" y="2878666"/>
-            <a:ext cx="7078133" cy="3507135"/>
-          </a:xfrm>
-          <a:prstGeom prst="rect">
-            <a:avLst/>
-          </a:prstGeom>
-          <a:noFill/>
-          <a:ln>
-            <a:noFill/>
-          </a:ln>
-        </p:spPr>
-      </p:pic>
-    </p:spTree>
   </p:cSld>
   <p:clrMapOvr>
     <a:masterClrMapping/>

</xml_diff>